<commit_message>
updated TEAM 8_FINAL PRESENTATION
</commit_message>
<xml_diff>
--- a/TEAM 8_FINAL_PRESENTATION.pptx
+++ b/TEAM 8_FINAL_PRESENTATION.pptx
@@ -14,16 +14,20 @@
     <p:sldId id="278" r:id="rId8"/>
     <p:sldId id="303" r:id="rId9"/>
     <p:sldId id="304" r:id="rId10"/>
-    <p:sldId id="281" r:id="rId11"/>
-    <p:sldId id="268" r:id="rId12"/>
-    <p:sldId id="293" r:id="rId13"/>
-    <p:sldId id="271" r:id="rId14"/>
-    <p:sldId id="307" r:id="rId15"/>
-    <p:sldId id="287" r:id="rId16"/>
-    <p:sldId id="308" r:id="rId17"/>
-    <p:sldId id="282" r:id="rId18"/>
-    <p:sldId id="309" r:id="rId19"/>
-    <p:sldId id="300" r:id="rId20"/>
+    <p:sldId id="279" r:id="rId11"/>
+    <p:sldId id="265" r:id="rId12"/>
+    <p:sldId id="281" r:id="rId13"/>
+    <p:sldId id="268" r:id="rId14"/>
+    <p:sldId id="293" r:id="rId15"/>
+    <p:sldId id="271" r:id="rId16"/>
+    <p:sldId id="307" r:id="rId17"/>
+    <p:sldId id="270" r:id="rId18"/>
+    <p:sldId id="284" r:id="rId19"/>
+    <p:sldId id="287" r:id="rId20"/>
+    <p:sldId id="308" r:id="rId21"/>
+    <p:sldId id="282" r:id="rId22"/>
+    <p:sldId id="309" r:id="rId23"/>
+    <p:sldId id="300" r:id="rId24"/>
   </p:sldIdLst>
   <p:sldSz cx="12192000" cy="6858000"/>
   <p:notesSz cx="6858000" cy="9144000"/>
@@ -471,7 +475,7 @@
           <a:p>
             <a:fld id="{5D086F0A-AF7E-4566-93F7-8A62D64384D9}" type="datetimeFigureOut">
               <a:rPr lang="en-IN" smtClean="0"/>
-              <a:t>08-12-2022</a:t>
+              <a:t>08/12/22</a:t>
             </a:fld>
             <a:endParaRPr lang="en-IN"/>
           </a:p>
@@ -669,7 +673,7 @@
           <a:p>
             <a:fld id="{5D086F0A-AF7E-4566-93F7-8A62D64384D9}" type="datetimeFigureOut">
               <a:rPr lang="en-IN" smtClean="0"/>
-              <a:t>08-12-2022</a:t>
+              <a:t>08/12/22</a:t>
             </a:fld>
             <a:endParaRPr lang="en-IN"/>
           </a:p>
@@ -877,7 +881,7 @@
           <a:p>
             <a:fld id="{5D086F0A-AF7E-4566-93F7-8A62D64384D9}" type="datetimeFigureOut">
               <a:rPr lang="en-IN" smtClean="0"/>
-              <a:t>08-12-2022</a:t>
+              <a:t>08/12/22</a:t>
             </a:fld>
             <a:endParaRPr lang="en-IN"/>
           </a:p>
@@ -1075,7 +1079,7 @@
           <a:p>
             <a:fld id="{5D086F0A-AF7E-4566-93F7-8A62D64384D9}" type="datetimeFigureOut">
               <a:rPr lang="en-IN" smtClean="0"/>
-              <a:t>08-12-2022</a:t>
+              <a:t>08/12/22</a:t>
             </a:fld>
             <a:endParaRPr lang="en-IN"/>
           </a:p>
@@ -1350,7 +1354,7 @@
           <a:p>
             <a:fld id="{5D086F0A-AF7E-4566-93F7-8A62D64384D9}" type="datetimeFigureOut">
               <a:rPr lang="en-IN" smtClean="0"/>
-              <a:t>08-12-2022</a:t>
+              <a:t>08/12/22</a:t>
             </a:fld>
             <a:endParaRPr lang="en-IN"/>
           </a:p>
@@ -1615,7 +1619,7 @@
           <a:p>
             <a:fld id="{5D086F0A-AF7E-4566-93F7-8A62D64384D9}" type="datetimeFigureOut">
               <a:rPr lang="en-IN" smtClean="0"/>
-              <a:t>08-12-2022</a:t>
+              <a:t>08/12/22</a:t>
             </a:fld>
             <a:endParaRPr lang="en-IN"/>
           </a:p>
@@ -2027,7 +2031,7 @@
           <a:p>
             <a:fld id="{5D086F0A-AF7E-4566-93F7-8A62D64384D9}" type="datetimeFigureOut">
               <a:rPr lang="en-IN" smtClean="0"/>
-              <a:t>08-12-2022</a:t>
+              <a:t>08/12/22</a:t>
             </a:fld>
             <a:endParaRPr lang="en-IN"/>
           </a:p>
@@ -2168,7 +2172,7 @@
           <a:p>
             <a:fld id="{5D086F0A-AF7E-4566-93F7-8A62D64384D9}" type="datetimeFigureOut">
               <a:rPr lang="en-IN" smtClean="0"/>
-              <a:t>08-12-2022</a:t>
+              <a:t>08/12/22</a:t>
             </a:fld>
             <a:endParaRPr lang="en-IN"/>
           </a:p>
@@ -2281,7 +2285,7 @@
           <a:p>
             <a:fld id="{5D086F0A-AF7E-4566-93F7-8A62D64384D9}" type="datetimeFigureOut">
               <a:rPr lang="en-IN" smtClean="0"/>
-              <a:t>08-12-2022</a:t>
+              <a:t>08/12/22</a:t>
             </a:fld>
             <a:endParaRPr lang="en-IN"/>
           </a:p>
@@ -2592,7 +2596,7 @@
           <a:p>
             <a:fld id="{5D086F0A-AF7E-4566-93F7-8A62D64384D9}" type="datetimeFigureOut">
               <a:rPr lang="en-IN" smtClean="0"/>
-              <a:t>08-12-2022</a:t>
+              <a:t>08/12/22</a:t>
             </a:fld>
             <a:endParaRPr lang="en-IN"/>
           </a:p>
@@ -2880,7 +2884,7 @@
           <a:p>
             <a:fld id="{5D086F0A-AF7E-4566-93F7-8A62D64384D9}" type="datetimeFigureOut">
               <a:rPr lang="en-IN" smtClean="0"/>
-              <a:t>08-12-2022</a:t>
+              <a:t>08/12/22</a:t>
             </a:fld>
             <a:endParaRPr lang="en-IN"/>
           </a:p>
@@ -3121,7 +3125,7 @@
           <a:p>
             <a:fld id="{5D086F0A-AF7E-4566-93F7-8A62D64384D9}" type="datetimeFigureOut">
               <a:rPr lang="en-IN" smtClean="0"/>
-              <a:t>08-12-2022</a:t>
+              <a:t>08/12/22</a:t>
             </a:fld>
             <a:endParaRPr lang="en-IN"/>
           </a:p>
@@ -4261,6 +4265,466 @@
 <file path=ppt/slides/slide10.xml><?xml version="1.0" encoding="utf-8"?>
 <p:sld xmlns:a="http://schemas.openxmlformats.org/drawingml/2006/main" xmlns:r="http://schemas.openxmlformats.org/officeDocument/2006/relationships" xmlns:p="http://schemas.openxmlformats.org/presentationml/2006/main">
   <p:cSld>
+    <p:spTree>
+      <p:nvGrpSpPr>
+        <p:cNvPr id="1" name=""/>
+        <p:cNvGrpSpPr/>
+        <p:nvPr/>
+      </p:nvGrpSpPr>
+      <p:grpSpPr>
+        <a:xfrm>
+          <a:off x="0" y="0"/>
+          <a:ext cx="0" cy="0"/>
+          <a:chOff x="0" y="0"/>
+          <a:chExt cx="0" cy="0"/>
+        </a:xfrm>
+      </p:grpSpPr>
+      <p:sp>
+        <p:nvSpPr>
+          <p:cNvPr id="2" name="Title 1">
+            <a:extLst>
+              <a:ext uri="{FF2B5EF4-FFF2-40B4-BE49-F238E27FC236}">
+                <a16:creationId xmlns:a16="http://schemas.microsoft.com/office/drawing/2014/main" id="{53E6291E-D680-413F-9E39-E20E03AFDBD9}"/>
+              </a:ext>
+            </a:extLst>
+          </p:cNvPr>
+          <p:cNvSpPr>
+            <a:spLocks noGrp="1"/>
+          </p:cNvSpPr>
+          <p:nvPr>
+            <p:ph type="title"/>
+          </p:nvPr>
+        </p:nvSpPr>
+        <p:spPr>
+          <a:xfrm>
+            <a:off x="643467" y="321734"/>
+            <a:ext cx="10905066" cy="1135737"/>
+          </a:xfrm>
+        </p:spPr>
+        <p:txBody>
+          <a:bodyPr>
+            <a:normAutofit/>
+          </a:bodyPr>
+          <a:lstStyle/>
+          <a:p>
+            <a:r>
+              <a:rPr lang="en-IN" sz="3000" b="1" dirty="0">
+                <a:latin typeface="+mn-lt"/>
+                <a:cs typeface="Calibri Light" panose="020F0302020204030204" pitchFamily="34" charset="0"/>
+              </a:rPr>
+              <a:t>Step Wise Regression Method:</a:t>
+            </a:r>
+          </a:p>
+        </p:txBody>
+      </p:sp>
+      <p:sp>
+        <p:nvSpPr>
+          <p:cNvPr id="3" name="Content Placeholder 2">
+            <a:extLst>
+              <a:ext uri="{FF2B5EF4-FFF2-40B4-BE49-F238E27FC236}">
+                <a16:creationId xmlns:a16="http://schemas.microsoft.com/office/drawing/2014/main" id="{11FBBCF3-6E9D-0DEE-F311-24100B73E39F}"/>
+              </a:ext>
+            </a:extLst>
+          </p:cNvPr>
+          <p:cNvSpPr>
+            <a:spLocks noGrp="1"/>
+          </p:cNvSpPr>
+          <p:nvPr>
+            <p:ph idx="1"/>
+          </p:nvPr>
+        </p:nvSpPr>
+        <p:spPr>
+          <a:xfrm>
+            <a:off x="643467" y="1457471"/>
+            <a:ext cx="10905066" cy="4393982"/>
+          </a:xfrm>
+        </p:spPr>
+        <p:txBody>
+          <a:bodyPr>
+            <a:normAutofit/>
+          </a:bodyPr>
+          <a:lstStyle/>
+          <a:p>
+            <a:pPr marL="0" indent="0" fontAlgn="base">
+              <a:buNone/>
+            </a:pPr>
+            <a:endParaRPr lang="en-US" sz="2000" dirty="0">
+              <a:cs typeface="Calibri Light" panose="020F0302020204030204" pitchFamily="34" charset="0"/>
+            </a:endParaRPr>
+          </a:p>
+          <a:p>
+            <a:pPr fontAlgn="base"/>
+            <a:r>
+              <a:rPr lang="en-US" sz="2000" i="0" dirty="0">
+                <a:effectLst/>
+                <a:cs typeface="Calibri Light" panose="020F0302020204030204" pitchFamily="34" charset="0"/>
+              </a:rPr>
+              <a:t>Step wise regression model is a procedure we can use to build a regression model from a set of predictor variables by entering and removing predictors in a stepwise manner into the model until there is no statistically valid reason to enter or remove any more.</a:t>
+            </a:r>
+          </a:p>
+          <a:p>
+            <a:pPr fontAlgn="base"/>
+            <a:r>
+              <a:rPr lang="en-US" sz="2000" i="0" dirty="0">
+                <a:effectLst/>
+                <a:cs typeface="Calibri Light" panose="020F0302020204030204" pitchFamily="34" charset="0"/>
+              </a:rPr>
+              <a:t>The goal of stepwise regression is to build a regression model that includes all of the predictor variables that are statistically significantly related to the response variable.</a:t>
+            </a:r>
+          </a:p>
+          <a:p>
+            <a:pPr fontAlgn="base"/>
+            <a:r>
+              <a:rPr lang="en-US" sz="2000" i="0" dirty="0">
+                <a:effectLst/>
+                <a:cs typeface="Calibri Light" panose="020F0302020204030204" pitchFamily="34" charset="0"/>
+              </a:rPr>
+              <a:t>There are three strategies of stepwise regression:</a:t>
+            </a:r>
+          </a:p>
+          <a:p>
+            <a:pPr marL="457200" indent="-457200" fontAlgn="base">
+              <a:buFont typeface="+mj-lt"/>
+              <a:buAutoNum type="arabicPeriod"/>
+            </a:pPr>
+            <a:r>
+              <a:rPr lang="en-US" sz="2000" i="0" dirty="0">
+                <a:effectLst/>
+                <a:cs typeface="Calibri Light" panose="020F0302020204030204" pitchFamily="34" charset="0"/>
+              </a:rPr>
+              <a:t>Forward selection - starts with no predictors</a:t>
+            </a:r>
+          </a:p>
+          <a:p>
+            <a:pPr marL="457200" indent="-457200" fontAlgn="base">
+              <a:buFont typeface="+mj-lt"/>
+              <a:buAutoNum type="arabicPeriod"/>
+            </a:pPr>
+            <a:r>
+              <a:rPr lang="en-US" sz="2000" i="0" dirty="0">
+                <a:effectLst/>
+                <a:cs typeface="Calibri Light" panose="020F0302020204030204" pitchFamily="34" charset="0"/>
+              </a:rPr>
+              <a:t>Backward selection - starts with all predictors</a:t>
+            </a:r>
+          </a:p>
+          <a:p>
+            <a:pPr marL="457200" indent="-457200" fontAlgn="base">
+              <a:buFont typeface="+mj-lt"/>
+              <a:buAutoNum type="arabicPeriod"/>
+            </a:pPr>
+            <a:r>
+              <a:rPr lang="en-US" sz="2000" i="0" dirty="0">
+                <a:effectLst/>
+                <a:cs typeface="Calibri Light" panose="020F0302020204030204" pitchFamily="34" charset="0"/>
+              </a:rPr>
+              <a:t>Stepwise selection - combination of both forward and backward selections</a:t>
+            </a:r>
+          </a:p>
+          <a:p>
+            <a:pPr fontAlgn="base"/>
+            <a:endParaRPr lang="en-US" sz="2000" i="0" dirty="0">
+              <a:effectLst/>
+              <a:cs typeface="Calibri Light" panose="020F0302020204030204" pitchFamily="34" charset="0"/>
+            </a:endParaRPr>
+          </a:p>
+          <a:p>
+            <a:pPr fontAlgn="base"/>
+            <a:endParaRPr lang="en-US" sz="2000" b="1" i="0" dirty="0">
+              <a:effectLst/>
+              <a:latin typeface="Calibri Light" panose="020F0302020204030204" pitchFamily="34" charset="0"/>
+              <a:cs typeface="Calibri Light" panose="020F0302020204030204" pitchFamily="34" charset="0"/>
+            </a:endParaRPr>
+          </a:p>
+          <a:p>
+            <a:pPr fontAlgn="base"/>
+            <a:endParaRPr lang="en-US" sz="2000" b="1" i="0" dirty="0">
+              <a:effectLst/>
+              <a:latin typeface="Calibri Light" panose="020F0302020204030204" pitchFamily="34" charset="0"/>
+              <a:cs typeface="Calibri Light" panose="020F0302020204030204" pitchFamily="34" charset="0"/>
+            </a:endParaRPr>
+          </a:p>
+          <a:p>
+            <a:endParaRPr lang="en-IN" sz="2000" b="1" dirty="0">
+              <a:latin typeface="Calibri Light" panose="020F0302020204030204" pitchFamily="34" charset="0"/>
+              <a:cs typeface="Calibri Light" panose="020F0302020204030204" pitchFamily="34" charset="0"/>
+            </a:endParaRPr>
+          </a:p>
+          <a:p>
+            <a:endParaRPr lang="en-IN" sz="2000" b="1" dirty="0">
+              <a:latin typeface="Calibri Light" panose="020F0302020204030204" pitchFamily="34" charset="0"/>
+              <a:cs typeface="Calibri Light" panose="020F0302020204030204" pitchFamily="34" charset="0"/>
+            </a:endParaRPr>
+          </a:p>
+          <a:p>
+            <a:endParaRPr lang="en-IN" sz="2000" b="1" dirty="0">
+              <a:latin typeface="Calibri Light" panose="020F0302020204030204" pitchFamily="34" charset="0"/>
+              <a:cs typeface="Calibri Light" panose="020F0302020204030204" pitchFamily="34" charset="0"/>
+            </a:endParaRPr>
+          </a:p>
+        </p:txBody>
+      </p:sp>
+    </p:spTree>
+    <p:extLst>
+      <p:ext uri="{BB962C8B-B14F-4D97-AF65-F5344CB8AC3E}">
+        <p14:creationId xmlns:p14="http://schemas.microsoft.com/office/powerpoint/2010/main" val="3740500737"/>
+      </p:ext>
+    </p:extLst>
+  </p:cSld>
+  <p:clrMapOvr>
+    <a:masterClrMapping/>
+  </p:clrMapOvr>
+</p:sld>
+</file>
+
+<file path=ppt/slides/slide11.xml><?xml version="1.0" encoding="utf-8"?>
+<p:sld xmlns:a="http://schemas.openxmlformats.org/drawingml/2006/main" xmlns:r="http://schemas.openxmlformats.org/officeDocument/2006/relationships" xmlns:p="http://schemas.openxmlformats.org/presentationml/2006/main">
+  <p:cSld>
+    <p:spTree>
+      <p:nvGrpSpPr>
+        <p:cNvPr id="1" name=""/>
+        <p:cNvGrpSpPr/>
+        <p:nvPr/>
+      </p:nvGrpSpPr>
+      <p:grpSpPr>
+        <a:xfrm>
+          <a:off x="0" y="0"/>
+          <a:ext cx="0" cy="0"/>
+          <a:chOff x="0" y="0"/>
+          <a:chExt cx="0" cy="0"/>
+        </a:xfrm>
+      </p:grpSpPr>
+      <p:sp>
+        <p:nvSpPr>
+          <p:cNvPr id="2" name="Title 1">
+            <a:extLst>
+              <a:ext uri="{FF2B5EF4-FFF2-40B4-BE49-F238E27FC236}">
+                <a16:creationId xmlns:a16="http://schemas.microsoft.com/office/drawing/2014/main" id="{519158BA-6A92-700D-D8AD-282CEF27BA22}"/>
+              </a:ext>
+            </a:extLst>
+          </p:cNvPr>
+          <p:cNvSpPr>
+            <a:spLocks noGrp="1"/>
+          </p:cNvSpPr>
+          <p:nvPr>
+            <p:ph type="title"/>
+          </p:nvPr>
+        </p:nvSpPr>
+        <p:spPr>
+          <a:xfrm>
+            <a:off x="503583" y="278736"/>
+            <a:ext cx="10850217" cy="918692"/>
+          </a:xfrm>
+        </p:spPr>
+        <p:txBody>
+          <a:bodyPr>
+            <a:normAutofit/>
+          </a:bodyPr>
+          <a:lstStyle/>
+          <a:p>
+            <a:r>
+              <a:rPr lang="en-IN" sz="3000" b="1" dirty="0">
+                <a:latin typeface="+mn-lt"/>
+                <a:cs typeface="Calibri Light" panose="020F0302020204030204" pitchFamily="34" charset="0"/>
+              </a:rPr>
+              <a:t>Step Wise Regression Method: Results</a:t>
+            </a:r>
+          </a:p>
+        </p:txBody>
+      </p:sp>
+      <p:sp>
+        <p:nvSpPr>
+          <p:cNvPr id="3" name="Content Placeholder 2">
+            <a:extLst>
+              <a:ext uri="{FF2B5EF4-FFF2-40B4-BE49-F238E27FC236}">
+                <a16:creationId xmlns:a16="http://schemas.microsoft.com/office/drawing/2014/main" id="{A1DFF0E8-1246-AA19-818C-3A9FAD3306C1}"/>
+              </a:ext>
+            </a:extLst>
+          </p:cNvPr>
+          <p:cNvSpPr>
+            <a:spLocks noGrp="1"/>
+          </p:cNvSpPr>
+          <p:nvPr>
+            <p:ph idx="1"/>
+          </p:nvPr>
+        </p:nvSpPr>
+        <p:spPr>
+          <a:xfrm>
+            <a:off x="396741" y="1197428"/>
+            <a:ext cx="11398518" cy="5660571"/>
+          </a:xfrm>
+        </p:spPr>
+        <p:txBody>
+          <a:bodyPr>
+            <a:normAutofit fontScale="92500" lnSpcReduction="10000"/>
+          </a:bodyPr>
+          <a:lstStyle/>
+          <a:p>
+            <a:r>
+              <a:rPr lang="en-US" sz="2200" b="1" i="0" dirty="0">
+                <a:effectLst/>
+                <a:latin typeface="+mj-lt"/>
+                <a:cs typeface="Calibri Light" panose="020F0302020204030204" pitchFamily="34" charset="0"/>
+              </a:rPr>
+              <a:t>start with no predictors-sequentially add the most contributive predictors. After adding each new variable, remove any variables that no longer provide an improvement in the model </a:t>
+            </a:r>
+            <a:r>
+              <a:rPr lang="en-US" sz="2200" b="1" i="0" dirty="0">
+                <a:solidFill>
+                  <a:srgbClr val="021B34"/>
+                </a:solidFill>
+                <a:effectLst/>
+                <a:latin typeface="+mj-lt"/>
+                <a:cs typeface="Calibri Light" panose="020F0302020204030204" pitchFamily="34" charset="0"/>
+              </a:rPr>
+              <a:t>fit.</a:t>
+            </a:r>
+            <a:endParaRPr lang="en-IN" sz="2200" b="1" dirty="0">
+              <a:latin typeface="+mj-lt"/>
+              <a:cs typeface="Calibri Light" panose="020F0302020204030204" pitchFamily="34" charset="0"/>
+            </a:endParaRPr>
+          </a:p>
+          <a:p>
+            <a:endParaRPr lang="en-IN" b="1" dirty="0">
+              <a:latin typeface="+mj-lt"/>
+              <a:cs typeface="Calibri Light" panose="020F0302020204030204" pitchFamily="34" charset="0"/>
+            </a:endParaRPr>
+          </a:p>
+          <a:p>
+            <a:endParaRPr lang="en-IN" b="1" dirty="0">
+              <a:latin typeface="+mj-lt"/>
+              <a:cs typeface="Calibri Light" panose="020F0302020204030204" pitchFamily="34" charset="0"/>
+            </a:endParaRPr>
+          </a:p>
+          <a:p>
+            <a:endParaRPr lang="en-IN" b="1" dirty="0">
+              <a:latin typeface="+mj-lt"/>
+              <a:cs typeface="Calibri Light" panose="020F0302020204030204" pitchFamily="34" charset="0"/>
+            </a:endParaRPr>
+          </a:p>
+          <a:p>
+            <a:endParaRPr lang="en-IN" b="1" dirty="0">
+              <a:latin typeface="+mj-lt"/>
+              <a:cs typeface="Calibri Light" panose="020F0302020204030204" pitchFamily="34" charset="0"/>
+            </a:endParaRPr>
+          </a:p>
+          <a:p>
+            <a:endParaRPr lang="en-IN" b="1" dirty="0">
+              <a:latin typeface="+mj-lt"/>
+              <a:cs typeface="Calibri Light" panose="020F0302020204030204" pitchFamily="34" charset="0"/>
+            </a:endParaRPr>
+          </a:p>
+          <a:p>
+            <a:endParaRPr lang="en-US" dirty="0">
+              <a:latin typeface="+mj-lt"/>
+            </a:endParaRPr>
+          </a:p>
+          <a:p>
+            <a:endParaRPr lang="en-US" dirty="0">
+              <a:latin typeface="+mj-lt"/>
+            </a:endParaRPr>
+          </a:p>
+          <a:p>
+            <a:endParaRPr lang="en-US" dirty="0">
+              <a:latin typeface="+mj-lt"/>
+            </a:endParaRPr>
+          </a:p>
+          <a:p>
+            <a:endParaRPr lang="en-US" dirty="0">
+              <a:latin typeface="+mj-lt"/>
+            </a:endParaRPr>
+          </a:p>
+          <a:p>
+            <a:endParaRPr lang="en-US" dirty="0">
+              <a:latin typeface="+mj-lt"/>
+            </a:endParaRPr>
+          </a:p>
+          <a:p>
+            <a:r>
+              <a:rPr lang="en-US" sz="2200" b="1" dirty="0">
+                <a:latin typeface="+mj-lt"/>
+              </a:rPr>
+              <a:t>The features above are in the order of their importance for the model</a:t>
+            </a:r>
+          </a:p>
+        </p:txBody>
+      </p:sp>
+      <p:pic>
+        <p:nvPicPr>
+          <p:cNvPr id="9" name="Picture 8">
+            <a:extLst>
+              <a:ext uri="{FF2B5EF4-FFF2-40B4-BE49-F238E27FC236}">
+                <a16:creationId xmlns:a16="http://schemas.microsoft.com/office/drawing/2014/main" id="{BC4722B0-B7B9-2601-A8D8-1F79823AF3DF}"/>
+              </a:ext>
+            </a:extLst>
+          </p:cNvPr>
+          <p:cNvPicPr>
+            <a:picLocks noChangeAspect="1"/>
+          </p:cNvPicPr>
+          <p:nvPr/>
+        </p:nvPicPr>
+        <p:blipFill>
+          <a:blip r:embed="rId2"/>
+          <a:stretch>
+            <a:fillRect/>
+          </a:stretch>
+        </p:blipFill>
+        <p:spPr>
+          <a:xfrm>
+            <a:off x="1001254" y="1802744"/>
+            <a:ext cx="9426757" cy="967824"/>
+          </a:xfrm>
+          <a:prstGeom prst="rect">
+            <a:avLst/>
+          </a:prstGeom>
+        </p:spPr>
+      </p:pic>
+      <p:pic>
+        <p:nvPicPr>
+          <p:cNvPr id="6" name="Picture 5">
+            <a:extLst>
+              <a:ext uri="{FF2B5EF4-FFF2-40B4-BE49-F238E27FC236}">
+                <a16:creationId xmlns:a16="http://schemas.microsoft.com/office/drawing/2014/main" id="{6158FDC6-0FD2-620F-2583-0A9340DBA37C}"/>
+              </a:ext>
+            </a:extLst>
+          </p:cNvPr>
+          <p:cNvPicPr>
+            <a:picLocks noChangeAspect="1"/>
+          </p:cNvPicPr>
+          <p:nvPr/>
+        </p:nvPicPr>
+        <p:blipFill>
+          <a:blip r:embed="rId3"/>
+          <a:stretch>
+            <a:fillRect/>
+          </a:stretch>
+        </p:blipFill>
+        <p:spPr>
+          <a:xfrm>
+            <a:off x="931181" y="2877146"/>
+            <a:ext cx="9704162" cy="3120883"/>
+          </a:xfrm>
+          <a:prstGeom prst="rect">
+            <a:avLst/>
+          </a:prstGeom>
+        </p:spPr>
+      </p:pic>
+    </p:spTree>
+    <p:extLst>
+      <p:ext uri="{BB962C8B-B14F-4D97-AF65-F5344CB8AC3E}">
+        <p14:creationId xmlns:p14="http://schemas.microsoft.com/office/powerpoint/2010/main" val="851349849"/>
+      </p:ext>
+    </p:extLst>
+  </p:cSld>
+  <p:clrMapOvr>
+    <a:masterClrMapping/>
+  </p:clrMapOvr>
+</p:sld>
+</file>
+
+<file path=ppt/slides/slide12.xml><?xml version="1.0" encoding="utf-8"?>
+<p:sld xmlns:a="http://schemas.openxmlformats.org/drawingml/2006/main" xmlns:r="http://schemas.openxmlformats.org/officeDocument/2006/relationships" xmlns:p="http://schemas.openxmlformats.org/presentationml/2006/main">
+  <p:cSld>
     <p:bg>
       <p:bgPr>
         <a:solidFill>
@@ -5380,7 +5844,7 @@
 </p:sld>
 </file>
 
-<file path=ppt/slides/slide11.xml><?xml version="1.0" encoding="utf-8"?>
+<file path=ppt/slides/slide13.xml><?xml version="1.0" encoding="utf-8"?>
 <p:sld xmlns:a="http://schemas.openxmlformats.org/drawingml/2006/main" xmlns:r="http://schemas.openxmlformats.org/officeDocument/2006/relationships" xmlns:p="http://schemas.openxmlformats.org/presentationml/2006/main">
   <p:cSld>
     <p:spTree>
@@ -5676,7 +6140,7 @@
 </p:sld>
 </file>
 
-<file path=ppt/slides/slide12.xml><?xml version="1.0" encoding="utf-8"?>
+<file path=ppt/slides/slide14.xml><?xml version="1.0" encoding="utf-8"?>
 <p:sld xmlns:a="http://schemas.openxmlformats.org/drawingml/2006/main" xmlns:r="http://schemas.openxmlformats.org/officeDocument/2006/relationships" xmlns:p="http://schemas.openxmlformats.org/presentationml/2006/main">
   <p:cSld>
     <p:spTree>
@@ -6105,7 +6569,7 @@
 </p:sld>
 </file>
 
-<file path=ppt/slides/slide13.xml><?xml version="1.0" encoding="utf-8"?>
+<file path=ppt/slides/slide15.xml><?xml version="1.0" encoding="utf-8"?>
 <p:sld xmlns:a="http://schemas.openxmlformats.org/drawingml/2006/main" xmlns:r="http://schemas.openxmlformats.org/officeDocument/2006/relationships" xmlns:p="http://schemas.openxmlformats.org/presentationml/2006/main">
   <p:cSld>
     <p:spTree>
@@ -6546,625 +7010,6 @@
 </p:sld>
 </file>
 
-<file path=ppt/slides/slide14.xml><?xml version="1.0" encoding="utf-8"?>
-<p:sld xmlns:a="http://schemas.openxmlformats.org/drawingml/2006/main" xmlns:r="http://schemas.openxmlformats.org/officeDocument/2006/relationships" xmlns:p="http://schemas.openxmlformats.org/presentationml/2006/main">
-  <p:cSld>
-    <p:spTree>
-      <p:nvGrpSpPr>
-        <p:cNvPr id="1" name=""/>
-        <p:cNvGrpSpPr/>
-        <p:nvPr/>
-      </p:nvGrpSpPr>
-      <p:grpSpPr>
-        <a:xfrm>
-          <a:off x="0" y="0"/>
-          <a:ext cx="0" cy="0"/>
-          <a:chOff x="0" y="0"/>
-          <a:chExt cx="0" cy="0"/>
-        </a:xfrm>
-      </p:grpSpPr>
-      <p:sp>
-        <p:nvSpPr>
-          <p:cNvPr id="2" name="Title 1">
-            <a:extLst>
-              <a:ext uri="{FF2B5EF4-FFF2-40B4-BE49-F238E27FC236}">
-                <a16:creationId xmlns:a16="http://schemas.microsoft.com/office/drawing/2014/main" id="{BD76F5DC-947E-7F44-F695-683988A91641}"/>
-              </a:ext>
-            </a:extLst>
-          </p:cNvPr>
-          <p:cNvSpPr>
-            <a:spLocks noGrp="1"/>
-          </p:cNvSpPr>
-          <p:nvPr>
-            <p:ph type="title"/>
-          </p:nvPr>
-        </p:nvSpPr>
-        <p:spPr>
-          <a:xfrm>
-            <a:off x="466305" y="324525"/>
-            <a:ext cx="10515600" cy="672843"/>
-          </a:xfrm>
-        </p:spPr>
-        <p:txBody>
-          <a:bodyPr>
-            <a:normAutofit/>
-          </a:bodyPr>
-          <a:lstStyle/>
-          <a:p>
-            <a:r>
-              <a:rPr lang="en-IN" sz="3200" b="1" dirty="0">
-                <a:latin typeface="+mn-lt"/>
-              </a:rPr>
-              <a:t>Random Forest Regressor: Results</a:t>
-            </a:r>
-          </a:p>
-        </p:txBody>
-      </p:sp>
-      <p:sp>
-        <p:nvSpPr>
-          <p:cNvPr id="3" name="Content Placeholder 2">
-            <a:extLst>
-              <a:ext uri="{FF2B5EF4-FFF2-40B4-BE49-F238E27FC236}">
-                <a16:creationId xmlns:a16="http://schemas.microsoft.com/office/drawing/2014/main" id="{997CA512-24F3-ECA9-AB32-6426466FA640}"/>
-              </a:ext>
-            </a:extLst>
-          </p:cNvPr>
-          <p:cNvSpPr>
-            <a:spLocks noGrp="1"/>
-          </p:cNvSpPr>
-          <p:nvPr>
-            <p:ph idx="1"/>
-          </p:nvPr>
-        </p:nvSpPr>
-        <p:spPr>
-          <a:xfrm>
-            <a:off x="345989" y="997368"/>
-            <a:ext cx="11467070" cy="5708232"/>
-          </a:xfrm>
-        </p:spPr>
-        <p:txBody>
-          <a:bodyPr>
-            <a:normAutofit/>
-          </a:bodyPr>
-          <a:lstStyle/>
-          <a:p>
-            <a:pPr marL="0" indent="0">
-              <a:buNone/>
-            </a:pPr>
-            <a:endParaRPr lang="en-IN" dirty="0"/>
-          </a:p>
-          <a:p>
-            <a:pPr marL="0" indent="0">
-              <a:buNone/>
-            </a:pPr>
-            <a:endParaRPr lang="en-IN" dirty="0"/>
-          </a:p>
-          <a:p>
-            <a:pPr marL="0" indent="0">
-              <a:buNone/>
-            </a:pPr>
-            <a:endParaRPr lang="en-IN" dirty="0"/>
-          </a:p>
-          <a:p>
-            <a:pPr marL="0" indent="0">
-              <a:buNone/>
-            </a:pPr>
-            <a:endParaRPr lang="en-IN" dirty="0"/>
-          </a:p>
-          <a:p>
-            <a:pPr marL="0" indent="0">
-              <a:buNone/>
-            </a:pPr>
-            <a:endParaRPr lang="en-IN" dirty="0"/>
-          </a:p>
-          <a:p>
-            <a:pPr marL="0" indent="0">
-              <a:buNone/>
-            </a:pPr>
-            <a:endParaRPr lang="en-IN" dirty="0"/>
-          </a:p>
-          <a:p>
-            <a:pPr marL="0" indent="0">
-              <a:buNone/>
-            </a:pPr>
-            <a:endParaRPr lang="en-IN" dirty="0"/>
-          </a:p>
-          <a:p>
-            <a:pPr marL="0" indent="0">
-              <a:buNone/>
-            </a:pPr>
-            <a:endParaRPr lang="en-IN" dirty="0"/>
-          </a:p>
-          <a:p>
-            <a:pPr marL="0" indent="0">
-              <a:buNone/>
-            </a:pPr>
-            <a:endParaRPr lang="en-IN" dirty="0"/>
-          </a:p>
-          <a:p>
-            <a:pPr marL="0" indent="0">
-              <a:buNone/>
-            </a:pPr>
-            <a:r>
-              <a:rPr lang="en-IN" sz="2000" dirty="0"/>
-              <a:t>Using an iterative algorithm, we got the best value for the number of trees as 200 and the test </a:t>
-            </a:r>
-            <a:r>
-              <a:rPr lang="en-IN" sz="2000" dirty="0" err="1"/>
-              <a:t>Rsquared</a:t>
-            </a:r>
-            <a:r>
-              <a:rPr lang="en-IN" sz="2000" dirty="0"/>
-              <a:t> value for the best RF model is 90.64%.</a:t>
-            </a:r>
-          </a:p>
-          <a:p>
-            <a:pPr marL="0" indent="0">
-              <a:buNone/>
-            </a:pPr>
-            <a:endParaRPr lang="en-IN" dirty="0"/>
-          </a:p>
-          <a:p>
-            <a:endParaRPr lang="en-IN" dirty="0"/>
-          </a:p>
-          <a:p>
-            <a:endParaRPr lang="en-IN" dirty="0"/>
-          </a:p>
-        </p:txBody>
-      </p:sp>
-      <p:pic>
-        <p:nvPicPr>
-          <p:cNvPr id="5" name="Picture 4">
-            <a:extLst>
-              <a:ext uri="{FF2B5EF4-FFF2-40B4-BE49-F238E27FC236}">
-                <a16:creationId xmlns:a16="http://schemas.microsoft.com/office/drawing/2014/main" id="{EA26B0DE-07EE-2F83-BF6A-E965040E5CED}"/>
-              </a:ext>
-            </a:extLst>
-          </p:cNvPr>
-          <p:cNvPicPr>
-            <a:picLocks noChangeAspect="1"/>
-          </p:cNvPicPr>
-          <p:nvPr/>
-        </p:nvPicPr>
-        <p:blipFill>
-          <a:blip r:embed="rId2"/>
-          <a:stretch>
-            <a:fillRect/>
-          </a:stretch>
-        </p:blipFill>
-        <p:spPr>
-          <a:xfrm>
-            <a:off x="1655924" y="1380988"/>
-            <a:ext cx="8591393" cy="1518425"/>
-          </a:xfrm>
-          <a:prstGeom prst="rect">
-            <a:avLst/>
-          </a:prstGeom>
-        </p:spPr>
-      </p:pic>
-      <p:pic>
-        <p:nvPicPr>
-          <p:cNvPr id="8" name="Picture 7">
-            <a:extLst>
-              <a:ext uri="{FF2B5EF4-FFF2-40B4-BE49-F238E27FC236}">
-                <a16:creationId xmlns:a16="http://schemas.microsoft.com/office/drawing/2014/main" id="{CA0F4F21-2A3E-35F9-A47C-030A6143B518}"/>
-              </a:ext>
-            </a:extLst>
-          </p:cNvPr>
-          <p:cNvPicPr>
-            <a:picLocks noChangeAspect="1"/>
-          </p:cNvPicPr>
-          <p:nvPr/>
-        </p:nvPicPr>
-        <p:blipFill>
-          <a:blip r:embed="rId3"/>
-          <a:stretch>
-            <a:fillRect/>
-          </a:stretch>
-        </p:blipFill>
-        <p:spPr>
-          <a:xfrm>
-            <a:off x="3217626" y="3429000"/>
-            <a:ext cx="4290432" cy="1386960"/>
-          </a:xfrm>
-          <a:prstGeom prst="rect">
-            <a:avLst/>
-          </a:prstGeom>
-        </p:spPr>
-      </p:pic>
-    </p:spTree>
-    <p:extLst>
-      <p:ext uri="{BB962C8B-B14F-4D97-AF65-F5344CB8AC3E}">
-        <p14:creationId xmlns:p14="http://schemas.microsoft.com/office/powerpoint/2010/main" val="909250607"/>
-      </p:ext>
-    </p:extLst>
-  </p:cSld>
-  <p:clrMapOvr>
-    <a:masterClrMapping/>
-  </p:clrMapOvr>
-</p:sld>
-</file>
-
-<file path=ppt/slides/slide15.xml><?xml version="1.0" encoding="utf-8"?>
-<p:sld xmlns:a="http://schemas.openxmlformats.org/drawingml/2006/main" xmlns:r="http://schemas.openxmlformats.org/officeDocument/2006/relationships" xmlns:p="http://schemas.openxmlformats.org/presentationml/2006/main">
-  <p:cSld>
-    <p:spTree>
-      <p:nvGrpSpPr>
-        <p:cNvPr id="1" name=""/>
-        <p:cNvGrpSpPr/>
-        <p:nvPr/>
-      </p:nvGrpSpPr>
-      <p:grpSpPr>
-        <a:xfrm>
-          <a:off x="0" y="0"/>
-          <a:ext cx="0" cy="0"/>
-          <a:chOff x="0" y="0"/>
-          <a:chExt cx="0" cy="0"/>
-        </a:xfrm>
-      </p:grpSpPr>
-      <p:sp>
-        <p:nvSpPr>
-          <p:cNvPr id="2" name="Title 1">
-            <a:extLst>
-              <a:ext uri="{FF2B5EF4-FFF2-40B4-BE49-F238E27FC236}">
-                <a16:creationId xmlns:a16="http://schemas.microsoft.com/office/drawing/2014/main" id="{BD76F5DC-947E-7F44-F695-683988A91641}"/>
-              </a:ext>
-            </a:extLst>
-          </p:cNvPr>
-          <p:cNvSpPr>
-            <a:spLocks noGrp="1"/>
-          </p:cNvSpPr>
-          <p:nvPr>
-            <p:ph type="title"/>
-          </p:nvPr>
-        </p:nvSpPr>
-        <p:spPr>
-          <a:xfrm>
-            <a:off x="765752" y="93278"/>
-            <a:ext cx="10515600" cy="661570"/>
-          </a:xfrm>
-        </p:spPr>
-        <p:txBody>
-          <a:bodyPr>
-            <a:normAutofit/>
-          </a:bodyPr>
-          <a:lstStyle/>
-          <a:p>
-            <a:r>
-              <a:rPr lang="en-IN" sz="3200" b="1" dirty="0" err="1">
-                <a:latin typeface="+mn-lt"/>
-              </a:rPr>
-              <a:t>XGBoost</a:t>
-            </a:r>
-            <a:r>
-              <a:rPr lang="en-IN" sz="3200" b="1" dirty="0">
-                <a:latin typeface="+mn-lt"/>
-              </a:rPr>
-              <a:t> Regressor – Intuition</a:t>
-            </a:r>
-          </a:p>
-        </p:txBody>
-      </p:sp>
-      <p:sp>
-        <p:nvSpPr>
-          <p:cNvPr id="3" name="Content Placeholder 2">
-            <a:extLst>
-              <a:ext uri="{FF2B5EF4-FFF2-40B4-BE49-F238E27FC236}">
-                <a16:creationId xmlns:a16="http://schemas.microsoft.com/office/drawing/2014/main" id="{997CA512-24F3-ECA9-AB32-6426466FA640}"/>
-              </a:ext>
-            </a:extLst>
-          </p:cNvPr>
-          <p:cNvSpPr>
-            <a:spLocks noGrp="1"/>
-          </p:cNvSpPr>
-          <p:nvPr>
-            <p:ph idx="1"/>
-          </p:nvPr>
-        </p:nvSpPr>
-        <p:spPr>
-          <a:xfrm>
-            <a:off x="329514" y="858252"/>
-            <a:ext cx="11681253" cy="5906469"/>
-          </a:xfrm>
-        </p:spPr>
-        <p:txBody>
-          <a:bodyPr>
-            <a:normAutofit/>
-          </a:bodyPr>
-          <a:lstStyle/>
-          <a:p>
-            <a:pPr marL="0" indent="0">
-              <a:buNone/>
-            </a:pPr>
-            <a:r>
-              <a:rPr lang="en-IN" sz="2000" dirty="0" err="1"/>
-              <a:t>XGBoost</a:t>
-            </a:r>
-            <a:r>
-              <a:rPr lang="en-IN" sz="2000" dirty="0"/>
-              <a:t> Regressor is one of the ensemble techniques which is based on the boosting mechanism.</a:t>
-            </a:r>
-          </a:p>
-        </p:txBody>
-      </p:sp>
-      <p:sp>
-        <p:nvSpPr>
-          <p:cNvPr id="5" name="TextBox 4">
-            <a:extLst>
-              <a:ext uri="{FF2B5EF4-FFF2-40B4-BE49-F238E27FC236}">
-                <a16:creationId xmlns:a16="http://schemas.microsoft.com/office/drawing/2014/main" id="{95E3701D-6FF2-6C5E-D17E-5DBBF52D079E}"/>
-              </a:ext>
-            </a:extLst>
-          </p:cNvPr>
-          <p:cNvSpPr txBox="1"/>
-          <p:nvPr/>
-        </p:nvSpPr>
-        <p:spPr>
-          <a:xfrm>
-            <a:off x="6714635" y="3492478"/>
-            <a:ext cx="4774234" cy="369332"/>
-          </a:xfrm>
-          <a:prstGeom prst="rect">
-            <a:avLst/>
-          </a:prstGeom>
-          <a:noFill/>
-        </p:spPr>
-        <p:txBody>
-          <a:bodyPr wrap="square" rtlCol="0">
-            <a:spAutoFit/>
-          </a:bodyPr>
-          <a:lstStyle/>
-          <a:p>
-            <a:pPr algn="ctr"/>
-            <a:r>
-              <a:rPr lang="en-IN" b="1" dirty="0"/>
-              <a:t>Calculating gain using similarity score</a:t>
-            </a:r>
-          </a:p>
-        </p:txBody>
-      </p:sp>
-      <p:pic>
-        <p:nvPicPr>
-          <p:cNvPr id="7" name="Picture 6">
-            <a:extLst>
-              <a:ext uri="{FF2B5EF4-FFF2-40B4-BE49-F238E27FC236}">
-                <a16:creationId xmlns:a16="http://schemas.microsoft.com/office/drawing/2014/main" id="{0B3134F0-93EE-E7F1-0440-EAC1F40D9014}"/>
-              </a:ext>
-            </a:extLst>
-          </p:cNvPr>
-          <p:cNvPicPr>
-            <a:picLocks noChangeAspect="1"/>
-          </p:cNvPicPr>
-          <p:nvPr/>
-        </p:nvPicPr>
-        <p:blipFill>
-          <a:blip r:embed="rId2"/>
-          <a:stretch>
-            <a:fillRect/>
-          </a:stretch>
-        </p:blipFill>
-        <p:spPr>
-          <a:xfrm>
-            <a:off x="572967" y="2217901"/>
-            <a:ext cx="4927959" cy="4397121"/>
-          </a:xfrm>
-          <a:prstGeom prst="rect">
-            <a:avLst/>
-          </a:prstGeom>
-        </p:spPr>
-      </p:pic>
-      <p:pic>
-        <p:nvPicPr>
-          <p:cNvPr id="9" name="Picture 8">
-            <a:extLst>
-              <a:ext uri="{FF2B5EF4-FFF2-40B4-BE49-F238E27FC236}">
-                <a16:creationId xmlns:a16="http://schemas.microsoft.com/office/drawing/2014/main" id="{C30164FD-5106-09B6-4054-44362A155EB2}"/>
-              </a:ext>
-            </a:extLst>
-          </p:cNvPr>
-          <p:cNvPicPr>
-            <a:picLocks noChangeAspect="1"/>
-          </p:cNvPicPr>
-          <p:nvPr/>
-        </p:nvPicPr>
-        <p:blipFill>
-          <a:blip r:embed="rId3"/>
-          <a:stretch>
-            <a:fillRect/>
-          </a:stretch>
-        </p:blipFill>
-        <p:spPr>
-          <a:xfrm>
-            <a:off x="6665604" y="1546467"/>
-            <a:ext cx="4953429" cy="1447925"/>
-          </a:xfrm>
-          <a:prstGeom prst="rect">
-            <a:avLst/>
-          </a:prstGeom>
-        </p:spPr>
-      </p:pic>
-      <p:pic>
-        <p:nvPicPr>
-          <p:cNvPr id="11" name="Picture 10">
-            <a:extLst>
-              <a:ext uri="{FF2B5EF4-FFF2-40B4-BE49-F238E27FC236}">
-                <a16:creationId xmlns:a16="http://schemas.microsoft.com/office/drawing/2014/main" id="{AC775000-845C-4417-F76A-0FA7C0346FFF}"/>
-              </a:ext>
-            </a:extLst>
-          </p:cNvPr>
-          <p:cNvPicPr>
-            <a:picLocks noChangeAspect="1"/>
-          </p:cNvPicPr>
-          <p:nvPr/>
-        </p:nvPicPr>
-        <p:blipFill>
-          <a:blip r:embed="rId4"/>
-          <a:stretch>
-            <a:fillRect/>
-          </a:stretch>
-        </p:blipFill>
-        <p:spPr>
-          <a:xfrm>
-            <a:off x="7490053" y="3970082"/>
-            <a:ext cx="4701947" cy="2598645"/>
-          </a:xfrm>
-          <a:prstGeom prst="rect">
-            <a:avLst/>
-          </a:prstGeom>
-        </p:spPr>
-      </p:pic>
-      <p:sp>
-        <p:nvSpPr>
-          <p:cNvPr id="12" name="TextBox 11">
-            <a:extLst>
-              <a:ext uri="{FF2B5EF4-FFF2-40B4-BE49-F238E27FC236}">
-                <a16:creationId xmlns:a16="http://schemas.microsoft.com/office/drawing/2014/main" id="{B8951F85-DC26-6DBD-EF7D-CFF1001BC6DE}"/>
-              </a:ext>
-            </a:extLst>
-          </p:cNvPr>
-          <p:cNvSpPr txBox="1"/>
-          <p:nvPr/>
-        </p:nvSpPr>
-        <p:spPr>
-          <a:xfrm>
-            <a:off x="1860883" y="1848569"/>
-            <a:ext cx="2382960" cy="400110"/>
-          </a:xfrm>
-          <a:prstGeom prst="rect">
-            <a:avLst/>
-          </a:prstGeom>
-          <a:noFill/>
-        </p:spPr>
-        <p:txBody>
-          <a:bodyPr wrap="none" rtlCol="0">
-            <a:spAutoFit/>
-          </a:bodyPr>
-          <a:lstStyle/>
-          <a:p>
-            <a:r>
-              <a:rPr lang="en-IN" sz="2000" b="1" dirty="0" err="1"/>
-              <a:t>XGBoost</a:t>
-            </a:r>
-            <a:r>
-              <a:rPr lang="en-IN" sz="2000" b="1" dirty="0"/>
-              <a:t> Mechanism</a:t>
-            </a:r>
-          </a:p>
-        </p:txBody>
-      </p:sp>
-      <p:pic>
-        <p:nvPicPr>
-          <p:cNvPr id="17" name="Picture 16">
-            <a:extLst>
-              <a:ext uri="{FF2B5EF4-FFF2-40B4-BE49-F238E27FC236}">
-                <a16:creationId xmlns:a16="http://schemas.microsoft.com/office/drawing/2014/main" id="{DA9D3D87-79B6-C146-AC63-FF8E230DAA59}"/>
-              </a:ext>
-            </a:extLst>
-          </p:cNvPr>
-          <p:cNvPicPr>
-            <a:picLocks noChangeAspect="1"/>
-          </p:cNvPicPr>
-          <p:nvPr/>
-        </p:nvPicPr>
-        <p:blipFill>
-          <a:blip r:embed="rId5"/>
-          <a:stretch>
-            <a:fillRect/>
-          </a:stretch>
-        </p:blipFill>
-        <p:spPr>
-          <a:xfrm>
-            <a:off x="6195876" y="4406582"/>
-            <a:ext cx="990399" cy="1725643"/>
-          </a:xfrm>
-          <a:prstGeom prst="rect">
-            <a:avLst/>
-          </a:prstGeom>
-        </p:spPr>
-      </p:pic>
-      <p:sp>
-        <p:nvSpPr>
-          <p:cNvPr id="18" name="TextBox 17">
-            <a:extLst>
-              <a:ext uri="{FF2B5EF4-FFF2-40B4-BE49-F238E27FC236}">
-                <a16:creationId xmlns:a16="http://schemas.microsoft.com/office/drawing/2014/main" id="{6511EB39-8AFF-901A-39FD-E60246B34A72}"/>
-              </a:ext>
-            </a:extLst>
-          </p:cNvPr>
-          <p:cNvSpPr txBox="1"/>
-          <p:nvPr/>
-        </p:nvSpPr>
-        <p:spPr>
-          <a:xfrm>
-            <a:off x="8793566" y="4761701"/>
-            <a:ext cx="381836" cy="369332"/>
-          </a:xfrm>
-          <a:prstGeom prst="rect">
-            <a:avLst/>
-          </a:prstGeom>
-          <a:noFill/>
-        </p:spPr>
-        <p:txBody>
-          <a:bodyPr wrap="none" rtlCol="0">
-            <a:spAutoFit/>
-          </a:bodyPr>
-          <a:lstStyle/>
-          <a:p>
-            <a:r>
-              <a:rPr lang="en-IN" dirty="0"/>
-              <a:t>M</a:t>
-            </a:r>
-          </a:p>
-        </p:txBody>
-      </p:sp>
-      <p:sp>
-        <p:nvSpPr>
-          <p:cNvPr id="19" name="TextBox 18">
-            <a:extLst>
-              <a:ext uri="{FF2B5EF4-FFF2-40B4-BE49-F238E27FC236}">
-                <a16:creationId xmlns:a16="http://schemas.microsoft.com/office/drawing/2014/main" id="{4F2D7826-202D-E69C-D66E-7C9ABA715F12}"/>
-              </a:ext>
-            </a:extLst>
-          </p:cNvPr>
-          <p:cNvSpPr txBox="1"/>
-          <p:nvPr/>
-        </p:nvSpPr>
-        <p:spPr>
-          <a:xfrm>
-            <a:off x="10026316" y="4761701"/>
-            <a:ext cx="290464" cy="369332"/>
-          </a:xfrm>
-          <a:prstGeom prst="rect">
-            <a:avLst/>
-          </a:prstGeom>
-          <a:noFill/>
-        </p:spPr>
-        <p:txBody>
-          <a:bodyPr wrap="none" rtlCol="0">
-            <a:spAutoFit/>
-          </a:bodyPr>
-          <a:lstStyle/>
-          <a:p>
-            <a:r>
-              <a:rPr lang="en-IN" dirty="0"/>
-              <a:t>F</a:t>
-            </a:r>
-          </a:p>
-        </p:txBody>
-      </p:sp>
-    </p:spTree>
-    <p:extLst>
-      <p:ext uri="{BB962C8B-B14F-4D97-AF65-F5344CB8AC3E}">
-        <p14:creationId xmlns:p14="http://schemas.microsoft.com/office/powerpoint/2010/main" val="969963409"/>
-      </p:ext>
-    </p:extLst>
-  </p:cSld>
-  <p:clrMapOvr>
-    <a:masterClrMapping/>
-  </p:clrMapOvr>
-</p:sld>
-</file>
-
 <file path=ppt/slides/slide16.xml><?xml version="1.0" encoding="utf-8"?>
 <p:sld xmlns:a="http://schemas.openxmlformats.org/drawingml/2006/main" xmlns:r="http://schemas.openxmlformats.org/officeDocument/2006/relationships" xmlns:p="http://schemas.openxmlformats.org/presentationml/2006/main">
   <p:cSld>
@@ -7187,7 +7032,7 @@
           <p:cNvPr id="2" name="Title 1">
             <a:extLst>
               <a:ext uri="{FF2B5EF4-FFF2-40B4-BE49-F238E27FC236}">
-                <a16:creationId xmlns:a16="http://schemas.microsoft.com/office/drawing/2014/main" id="{456FBD11-8B7B-7BF2-9D53-585FE75D1D31}"/>
+                <a16:creationId xmlns:a16="http://schemas.microsoft.com/office/drawing/2014/main" id="{BD76F5DC-947E-7F44-F695-683988A91641}"/>
               </a:ext>
             </a:extLst>
           </p:cNvPr>
@@ -7200,27 +7045,21 @@
         </p:nvSpPr>
         <p:spPr>
           <a:xfrm>
-            <a:off x="838200" y="42434"/>
-            <a:ext cx="10515600" cy="629486"/>
+            <a:off x="466305" y="324525"/>
+            <a:ext cx="10515600" cy="672843"/>
           </a:xfrm>
         </p:spPr>
         <p:txBody>
           <a:bodyPr>
-            <a:noAutofit/>
+            <a:normAutofit/>
           </a:bodyPr>
           <a:lstStyle/>
           <a:p>
-            <a:r>
-              <a:rPr lang="en-IN" sz="3200" b="1" dirty="0" err="1">
-                <a:latin typeface="+mn-lt"/>
-              </a:rPr>
-              <a:t>XGBoost</a:t>
-            </a:r>
             <a:r>
               <a:rPr lang="en-IN" sz="3200" b="1" dirty="0">
                 <a:latin typeface="+mn-lt"/>
               </a:rPr>
-              <a:t> Regressor with Hyperparameter Tuning</a:t>
+              <a:t>Random Forest Regressor: Results</a:t>
             </a:r>
           </a:p>
         </p:txBody>
@@ -7230,7 +7069,7 @@
           <p:cNvPr id="3" name="Content Placeholder 2">
             <a:extLst>
               <a:ext uri="{FF2B5EF4-FFF2-40B4-BE49-F238E27FC236}">
-                <a16:creationId xmlns:a16="http://schemas.microsoft.com/office/drawing/2014/main" id="{7628083F-234A-A296-2D98-6D90F9E543AA}"/>
+                <a16:creationId xmlns:a16="http://schemas.microsoft.com/office/drawing/2014/main" id="{997CA512-24F3-ECA9-AB32-6426466FA640}"/>
               </a:ext>
             </a:extLst>
           </p:cNvPr>
@@ -7243,8 +7082,8 @@
         </p:nvSpPr>
         <p:spPr>
           <a:xfrm>
-            <a:off x="838200" y="818146"/>
-            <a:ext cx="10864516" cy="5997420"/>
+            <a:off x="345989" y="997368"/>
+            <a:ext cx="11467070" cy="5708232"/>
           </a:xfrm>
         </p:spPr>
         <p:txBody>
@@ -7253,70 +7092,66 @@
           </a:bodyPr>
           <a:lstStyle/>
           <a:p>
-            <a:endParaRPr lang="en-IN" sz="2000" dirty="0"/>
-          </a:p>
-          <a:p>
-            <a:endParaRPr lang="en-IN" sz="2000" dirty="0"/>
-          </a:p>
-          <a:p>
-            <a:endParaRPr lang="en-IN" sz="2000" dirty="0"/>
-          </a:p>
-          <a:p>
-            <a:endParaRPr lang="en-IN" sz="2000" dirty="0"/>
-          </a:p>
-          <a:p>
-            <a:endParaRPr lang="en-IN" sz="2000" dirty="0"/>
-          </a:p>
-          <a:p>
-            <a:endParaRPr lang="en-IN" sz="2000" dirty="0"/>
-          </a:p>
-          <a:p>
-            <a:endParaRPr lang="en-IN" sz="2000" dirty="0"/>
-          </a:p>
-          <a:p>
-            <a:endParaRPr lang="en-IN" sz="2000" dirty="0"/>
-          </a:p>
-          <a:p>
-            <a:endParaRPr lang="en-IN" sz="2000" dirty="0"/>
-          </a:p>
-          <a:p>
-            <a:endParaRPr lang="en-IN" sz="2000" dirty="0"/>
-          </a:p>
-          <a:p>
             <a:pPr marL="0" indent="0">
               <a:buNone/>
             </a:pPr>
-            <a:endParaRPr lang="en-IN" sz="2000" dirty="0"/>
+            <a:endParaRPr lang="en-IN" dirty="0"/>
           </a:p>
           <a:p>
             <a:pPr marL="0" indent="0">
               <a:buNone/>
             </a:pPr>
-            <a:endParaRPr lang="en-IN" sz="2000" dirty="0"/>
+            <a:endParaRPr lang="en-IN" dirty="0"/>
           </a:p>
           <a:p>
             <a:pPr marL="0" indent="0">
               <a:buNone/>
             </a:pPr>
+            <a:endParaRPr lang="en-IN" dirty="0"/>
+          </a:p>
+          <a:p>
+            <a:pPr marL="0" indent="0">
+              <a:buNone/>
+            </a:pPr>
+            <a:endParaRPr lang="en-IN" dirty="0"/>
+          </a:p>
+          <a:p>
+            <a:pPr marL="0" indent="0">
+              <a:buNone/>
+            </a:pPr>
+            <a:endParaRPr lang="en-IN" dirty="0"/>
+          </a:p>
+          <a:p>
+            <a:pPr marL="0" indent="0">
+              <a:buNone/>
+            </a:pPr>
+            <a:endParaRPr lang="en-IN" dirty="0"/>
+          </a:p>
+          <a:p>
+            <a:pPr marL="0" indent="0">
+              <a:buNone/>
+            </a:pPr>
+            <a:endParaRPr lang="en-IN" dirty="0"/>
+          </a:p>
+          <a:p>
+            <a:pPr marL="0" indent="0">
+              <a:buNone/>
+            </a:pPr>
+            <a:endParaRPr lang="en-IN" dirty="0"/>
+          </a:p>
+          <a:p>
+            <a:pPr marL="0" indent="0">
+              <a:buNone/>
+            </a:pPr>
+            <a:endParaRPr lang="en-IN" dirty="0"/>
+          </a:p>
+          <a:p>
+            <a:pPr marL="0" indent="0">
+              <a:buNone/>
+            </a:pPr>
             <a:r>
               <a:rPr lang="en-IN" sz="2000" dirty="0"/>
-              <a:t>Using the hyperparameter tuning method we got the model with </a:t>
-            </a:r>
-            <a:r>
-              <a:rPr lang="en-IN" sz="2000" dirty="0" err="1"/>
-              <a:t>max_depth</a:t>
-            </a:r>
-            <a:r>
-              <a:rPr lang="en-IN" sz="2000" dirty="0"/>
-              <a:t> 4 and </a:t>
-            </a:r>
-            <a:r>
-              <a:rPr lang="en-IN" sz="2000" dirty="0" err="1"/>
-              <a:t>nrounds</a:t>
-            </a:r>
-            <a:r>
-              <a:rPr lang="en-IN" sz="2000" dirty="0"/>
-              <a:t> = 600 is giving the maximum </a:t>
+              <a:t>Using an iterative algorithm, we got the best value for the number of trees as 200 and the test </a:t>
             </a:r>
             <a:r>
               <a:rPr lang="en-IN" sz="2000" dirty="0" err="1"/>
@@ -7324,17 +7159,29 @@
             </a:r>
             <a:r>
               <a:rPr lang="en-IN" sz="2000" dirty="0"/>
-              <a:t> value and Minimum root mean squared error.</a:t>
-            </a:r>
+              <a:t> value for the best RF model is 90.64%.</a:t>
+            </a:r>
+          </a:p>
+          <a:p>
+            <a:pPr marL="0" indent="0">
+              <a:buNone/>
+            </a:pPr>
+            <a:endParaRPr lang="en-IN" dirty="0"/>
+          </a:p>
+          <a:p>
+            <a:endParaRPr lang="en-IN" dirty="0"/>
+          </a:p>
+          <a:p>
+            <a:endParaRPr lang="en-IN" dirty="0"/>
           </a:p>
         </p:txBody>
       </p:sp>
       <p:pic>
         <p:nvPicPr>
-          <p:cNvPr id="7" name="Picture 6">
-            <a:extLst>
-              <a:ext uri="{FF2B5EF4-FFF2-40B4-BE49-F238E27FC236}">
-                <a16:creationId xmlns:a16="http://schemas.microsoft.com/office/drawing/2014/main" id="{53C517CC-D1E9-42A4-CFFA-D5CF395E90E2}"/>
+          <p:cNvPr id="5" name="Picture 4">
+            <a:extLst>
+              <a:ext uri="{FF2B5EF4-FFF2-40B4-BE49-F238E27FC236}">
+                <a16:creationId xmlns:a16="http://schemas.microsoft.com/office/drawing/2014/main" id="{EA26B0DE-07EE-2F83-BF6A-E965040E5CED}"/>
               </a:ext>
             </a:extLst>
           </p:cNvPr>
@@ -7351,8 +7198,8 @@
         </p:blipFill>
         <p:spPr>
           <a:xfrm>
-            <a:off x="1402358" y="1998019"/>
-            <a:ext cx="2911092" cy="556308"/>
+            <a:off x="1655924" y="1380988"/>
+            <a:ext cx="8591393" cy="1518425"/>
           </a:xfrm>
           <a:prstGeom prst="rect">
             <a:avLst/>
@@ -7361,10 +7208,10 @@
       </p:pic>
       <p:pic>
         <p:nvPicPr>
-          <p:cNvPr id="9" name="Picture 8">
-            <a:extLst>
-              <a:ext uri="{FF2B5EF4-FFF2-40B4-BE49-F238E27FC236}">
-                <a16:creationId xmlns:a16="http://schemas.microsoft.com/office/drawing/2014/main" id="{57601FF2-AEF6-AF2C-2022-DE49B1A0D6A2}"/>
+          <p:cNvPr id="8" name="Picture 7">
+            <a:extLst>
+              <a:ext uri="{FF2B5EF4-FFF2-40B4-BE49-F238E27FC236}">
+                <a16:creationId xmlns:a16="http://schemas.microsoft.com/office/drawing/2014/main" id="{CA0F4F21-2A3E-35F9-A47C-030A6143B518}"/>
               </a:ext>
             </a:extLst>
           </p:cNvPr>
@@ -7381,230 +7228,18 @@
         </p:blipFill>
         <p:spPr>
           <a:xfrm>
-            <a:off x="2039341" y="3651453"/>
-            <a:ext cx="7521592" cy="1714649"/>
+            <a:off x="3217626" y="3429000"/>
+            <a:ext cx="4290432" cy="1386960"/>
           </a:xfrm>
           <a:prstGeom prst="rect">
             <a:avLst/>
           </a:prstGeom>
         </p:spPr>
       </p:pic>
-      <p:pic>
-        <p:nvPicPr>
-          <p:cNvPr id="8" name="Picture 7">
-            <a:extLst>
-              <a:ext uri="{FF2B5EF4-FFF2-40B4-BE49-F238E27FC236}">
-                <a16:creationId xmlns:a16="http://schemas.microsoft.com/office/drawing/2014/main" id="{6B9AFACA-75A1-4F9E-2E89-335DB555DB8B}"/>
-              </a:ext>
-            </a:extLst>
-          </p:cNvPr>
-          <p:cNvPicPr>
-            <a:picLocks noChangeAspect="1"/>
-          </p:cNvPicPr>
-          <p:nvPr/>
-        </p:nvPicPr>
-        <p:blipFill>
-          <a:blip r:embed="rId4"/>
-          <a:stretch>
-            <a:fillRect/>
-          </a:stretch>
-        </p:blipFill>
-        <p:spPr>
-          <a:xfrm>
-            <a:off x="6905575" y="1704806"/>
-            <a:ext cx="3596952" cy="1089754"/>
-          </a:xfrm>
-          <a:prstGeom prst="rect">
-            <a:avLst/>
-          </a:prstGeom>
-        </p:spPr>
-      </p:pic>
-      <p:sp>
-        <p:nvSpPr>
-          <p:cNvPr id="10" name="TextBox 9">
-            <a:extLst>
-              <a:ext uri="{FF2B5EF4-FFF2-40B4-BE49-F238E27FC236}">
-                <a16:creationId xmlns:a16="http://schemas.microsoft.com/office/drawing/2014/main" id="{8C273F12-6DD8-2CCB-AC44-9B435C4C6723}"/>
-              </a:ext>
-            </a:extLst>
-          </p:cNvPr>
-          <p:cNvSpPr txBox="1"/>
-          <p:nvPr/>
-        </p:nvSpPr>
-        <p:spPr>
-          <a:xfrm>
-            <a:off x="2393221" y="3154770"/>
-            <a:ext cx="7042121" cy="400110"/>
-          </a:xfrm>
-          <a:prstGeom prst="rect">
-            <a:avLst/>
-          </a:prstGeom>
-          <a:noFill/>
-        </p:spPr>
-        <p:txBody>
-          <a:bodyPr wrap="none" rtlCol="0">
-            <a:spAutoFit/>
-          </a:bodyPr>
-          <a:lstStyle/>
-          <a:p>
-            <a:r>
-              <a:rPr lang="en-IN" sz="2000" dirty="0"/>
-              <a:t>An iterative algorithm to find the best value of depth and </a:t>
-            </a:r>
-            <a:r>
-              <a:rPr lang="en-IN" sz="2000" dirty="0" err="1"/>
-              <a:t>nrounds</a:t>
-            </a:r>
-            <a:endParaRPr lang="en-IN" sz="2000" dirty="0"/>
-          </a:p>
-        </p:txBody>
-      </p:sp>
-      <p:sp>
-        <p:nvSpPr>
-          <p:cNvPr id="11" name="TextBox 10">
-            <a:extLst>
-              <a:ext uri="{FF2B5EF4-FFF2-40B4-BE49-F238E27FC236}">
-                <a16:creationId xmlns:a16="http://schemas.microsoft.com/office/drawing/2014/main" id="{0545175F-B0D1-B4B0-AC42-B3083295CBD8}"/>
-              </a:ext>
-            </a:extLst>
-          </p:cNvPr>
-          <p:cNvSpPr txBox="1"/>
-          <p:nvPr/>
-        </p:nvSpPr>
-        <p:spPr>
-          <a:xfrm>
-            <a:off x="6217236" y="1152969"/>
-            <a:ext cx="5159426" cy="400110"/>
-          </a:xfrm>
-          <a:prstGeom prst="rect">
-            <a:avLst/>
-          </a:prstGeom>
-          <a:noFill/>
-        </p:spPr>
-        <p:txBody>
-          <a:bodyPr wrap="none" rtlCol="0">
-            <a:spAutoFit/>
-          </a:bodyPr>
-          <a:lstStyle/>
-          <a:p>
-            <a:r>
-              <a:rPr lang="en-IN" sz="2000" dirty="0"/>
-              <a:t>Matrix Transformation for training and test data</a:t>
-            </a:r>
-          </a:p>
-        </p:txBody>
-      </p:sp>
-      <p:sp>
-        <p:nvSpPr>
-          <p:cNvPr id="12" name="TextBox 11">
-            <a:extLst>
-              <a:ext uri="{FF2B5EF4-FFF2-40B4-BE49-F238E27FC236}">
-                <a16:creationId xmlns:a16="http://schemas.microsoft.com/office/drawing/2014/main" id="{495B9253-AEC1-0FFE-8581-C639B3D43440}"/>
-              </a:ext>
-            </a:extLst>
-          </p:cNvPr>
-          <p:cNvSpPr txBox="1"/>
-          <p:nvPr/>
-        </p:nvSpPr>
-        <p:spPr>
-          <a:xfrm>
-            <a:off x="628063" y="1160101"/>
-            <a:ext cx="4459682" cy="400110"/>
-          </a:xfrm>
-          <a:prstGeom prst="rect">
-            <a:avLst/>
-          </a:prstGeom>
-          <a:noFill/>
-        </p:spPr>
-        <p:txBody>
-          <a:bodyPr wrap="none" rtlCol="0">
-            <a:spAutoFit/>
-          </a:bodyPr>
-          <a:lstStyle/>
-          <a:p>
-            <a:r>
-              <a:rPr lang="en-IN" sz="2000" dirty="0"/>
-              <a:t>Passing range for hyperparameter Tuning</a:t>
-            </a:r>
-          </a:p>
-        </p:txBody>
-      </p:sp>
-      <p:cxnSp>
-        <p:nvCxnSpPr>
-          <p:cNvPr id="16" name="Straight Connector 15">
-            <a:extLst>
-              <a:ext uri="{FF2B5EF4-FFF2-40B4-BE49-F238E27FC236}">
-                <a16:creationId xmlns:a16="http://schemas.microsoft.com/office/drawing/2014/main" id="{5E6BDFD8-228E-C013-F161-BF847A507EB9}"/>
-              </a:ext>
-            </a:extLst>
-          </p:cNvPr>
-          <p:cNvCxnSpPr/>
-          <p:nvPr/>
-        </p:nvCxnSpPr>
-        <p:spPr>
-          <a:xfrm flipH="1">
-            <a:off x="1074821" y="3050751"/>
-            <a:ext cx="4369071" cy="0"/>
-          </a:xfrm>
-          <a:prstGeom prst="line">
-            <a:avLst/>
-          </a:prstGeom>
-        </p:spPr>
-        <p:style>
-          <a:lnRef idx="1">
-            <a:schemeClr val="accent1"/>
-          </a:lnRef>
-          <a:fillRef idx="0">
-            <a:schemeClr val="accent1"/>
-          </a:fillRef>
-          <a:effectRef idx="0">
-            <a:schemeClr val="accent1"/>
-          </a:effectRef>
-          <a:fontRef idx="minor">
-            <a:schemeClr val="tx1"/>
-          </a:fontRef>
-        </p:style>
-      </p:cxnSp>
-      <p:cxnSp>
-        <p:nvCxnSpPr>
-          <p:cNvPr id="18" name="Straight Connector 17">
-            <a:extLst>
-              <a:ext uri="{FF2B5EF4-FFF2-40B4-BE49-F238E27FC236}">
-                <a16:creationId xmlns:a16="http://schemas.microsoft.com/office/drawing/2014/main" id="{4E5DEB92-4259-F698-3F46-1D775B7F7322}"/>
-              </a:ext>
-            </a:extLst>
-          </p:cNvPr>
-          <p:cNvCxnSpPr/>
-          <p:nvPr/>
-        </p:nvCxnSpPr>
-        <p:spPr>
-          <a:xfrm>
-            <a:off x="5443892" y="3050751"/>
-            <a:ext cx="4897817" cy="0"/>
-          </a:xfrm>
-          <a:prstGeom prst="line">
-            <a:avLst/>
-          </a:prstGeom>
-        </p:spPr>
-        <p:style>
-          <a:lnRef idx="1">
-            <a:schemeClr val="accent1"/>
-          </a:lnRef>
-          <a:fillRef idx="0">
-            <a:schemeClr val="accent1"/>
-          </a:fillRef>
-          <a:effectRef idx="0">
-            <a:schemeClr val="accent1"/>
-          </a:effectRef>
-          <a:fontRef idx="minor">
-            <a:schemeClr val="tx1"/>
-          </a:fontRef>
-        </p:style>
-      </p:cxnSp>
     </p:spTree>
     <p:extLst>
       <p:ext uri="{BB962C8B-B14F-4D97-AF65-F5344CB8AC3E}">
-        <p14:creationId xmlns:p14="http://schemas.microsoft.com/office/powerpoint/2010/main" val="581151939"/>
+        <p14:creationId xmlns:p14="http://schemas.microsoft.com/office/powerpoint/2010/main" val="909250607"/>
       </p:ext>
     </p:extLst>
   </p:cSld>
@@ -7636,7 +7271,7 @@
           <p:cNvPr id="2" name="Title 1">
             <a:extLst>
               <a:ext uri="{FF2B5EF4-FFF2-40B4-BE49-F238E27FC236}">
-                <a16:creationId xmlns:a16="http://schemas.microsoft.com/office/drawing/2014/main" id="{265F92F4-49B1-0900-C83A-8CE9FE53DAE2}"/>
+                <a16:creationId xmlns:a16="http://schemas.microsoft.com/office/drawing/2014/main" id="{EEEEF9C9-55DC-5403-875C-001F30EED9B1}"/>
               </a:ext>
             </a:extLst>
           </p:cNvPr>
@@ -7649,8 +7284,8 @@
         </p:nvSpPr>
         <p:spPr>
           <a:xfrm>
-            <a:off x="838200" y="0"/>
-            <a:ext cx="10515600" cy="597400"/>
+            <a:off x="643467" y="321734"/>
+            <a:ext cx="10905066" cy="1135737"/>
           </a:xfrm>
         </p:spPr>
         <p:txBody>
@@ -7660,16 +7295,11 @@
           <a:lstStyle/>
           <a:p>
             <a:r>
-              <a:rPr lang="en-IN" sz="3200" b="1" dirty="0" err="1">
+              <a:rPr lang="en-IN" sz="3000" b="1" dirty="0">
                 <a:latin typeface="+mn-lt"/>
+                <a:cs typeface="Calibri Light" panose="020F0302020204030204" pitchFamily="34" charset="0"/>
               </a:rPr>
-              <a:t>XGBoost</a:t>
-            </a:r>
-            <a:r>
-              <a:rPr lang="en-IN" sz="3200" b="1" dirty="0">
-                <a:latin typeface="+mn-lt"/>
-              </a:rPr>
-              <a:t> – Best model selection with Hyperparameter Tuning</a:t>
+              <a:t>SVM Regressor:</a:t>
             </a:r>
           </a:p>
         </p:txBody>
@@ -7679,7 +7309,7 @@
           <p:cNvPr id="3" name="Content Placeholder 2">
             <a:extLst>
               <a:ext uri="{FF2B5EF4-FFF2-40B4-BE49-F238E27FC236}">
-                <a16:creationId xmlns:a16="http://schemas.microsoft.com/office/drawing/2014/main" id="{BB0956A1-B24B-0AB8-DE75-336352031BFB}"/>
+                <a16:creationId xmlns:a16="http://schemas.microsoft.com/office/drawing/2014/main" id="{FC940CB6-01B8-B804-9962-CCC2425AB771}"/>
               </a:ext>
             </a:extLst>
           </p:cNvPr>
@@ -7692,36 +7322,97 @@
         </p:nvSpPr>
         <p:spPr>
           <a:xfrm>
-            <a:off x="838200" y="1219200"/>
-            <a:ext cx="10515600" cy="4957763"/>
-          </a:xfrm>
-        </p:spPr>
-        <p:txBody>
-          <a:bodyPr/>
-          <a:lstStyle/>
-          <a:p>
-            <a:pPr marL="0" indent="0">
-              <a:buNone/>
-            </a:pPr>
-            <a:endParaRPr lang="en-IN" dirty="0"/>
-          </a:p>
-          <a:p>
-            <a:endParaRPr lang="en-IN" dirty="0"/>
-          </a:p>
-          <a:p>
-            <a:endParaRPr lang="en-IN" dirty="0"/>
-          </a:p>
-          <a:p>
-            <a:endParaRPr lang="en-IN" dirty="0"/>
+            <a:off x="643467" y="1113183"/>
+            <a:ext cx="10905066" cy="4721160"/>
+          </a:xfrm>
+        </p:spPr>
+        <p:txBody>
+          <a:bodyPr>
+            <a:normAutofit/>
+          </a:bodyPr>
+          <a:lstStyle/>
+          <a:p>
+            <a:pPr fontAlgn="base"/>
+            <a:endParaRPr lang="en-US" sz="1800" i="0" dirty="0">
+              <a:effectLst/>
+              <a:cs typeface="Calibri Light" panose="020F0302020204030204" pitchFamily="34" charset="0"/>
+            </a:endParaRPr>
+          </a:p>
+          <a:p>
+            <a:pPr fontAlgn="base"/>
+            <a:r>
+              <a:rPr lang="en-US" sz="1800" i="0" dirty="0">
+                <a:effectLst/>
+                <a:cs typeface="Calibri Light" panose="020F0302020204030204" pitchFamily="34" charset="0"/>
+              </a:rPr>
+              <a:t>Support Vector Machine can also be used for regression problem wherein dependent, or target variable is continuous.</a:t>
+            </a:r>
+          </a:p>
+          <a:p>
+            <a:pPr fontAlgn="base"/>
+            <a:r>
+              <a:rPr lang="en-US" sz="1800" i="0" dirty="0">
+                <a:effectLst/>
+                <a:cs typeface="Calibri Light" panose="020F0302020204030204" pitchFamily="34" charset="0"/>
+              </a:rPr>
+              <a:t>The goal of SVM regression is same as classification problem i.e. to find maximum margin. Here, it means minimize error. </a:t>
+            </a:r>
+          </a:p>
+          <a:p>
+            <a:pPr fontAlgn="base"/>
+            <a:r>
+              <a:rPr lang="en-US" sz="1800" i="0" dirty="0">
+                <a:effectLst/>
+                <a:cs typeface="Calibri Light" panose="020F0302020204030204" pitchFamily="34" charset="0"/>
+              </a:rPr>
+              <a:t>In the case of regression, a margin of tolerance (epsilon) is set in approximation to the SVM. </a:t>
+            </a:r>
+          </a:p>
+          <a:p>
+            <a:pPr fontAlgn="base"/>
+            <a:r>
+              <a:rPr lang="en-US" sz="1800" i="0" dirty="0">
+                <a:effectLst/>
+                <a:cs typeface="Calibri Light" panose="020F0302020204030204" pitchFamily="34" charset="0"/>
+              </a:rPr>
+              <a:t>The primary goal is to minimize error, individualizing the hyperplane which maximizes the margin, keeping in mind that part of the error is tolerated.</a:t>
+            </a:r>
+            <a:br>
+              <a:rPr lang="en-US" sz="1800" dirty="0">
+                <a:cs typeface="Calibri Light" panose="020F0302020204030204" pitchFamily="34" charset="0"/>
+              </a:rPr>
+            </a:br>
+            <a:endParaRPr lang="en-US" sz="1800" i="0" dirty="0">
+              <a:effectLst/>
+              <a:cs typeface="Calibri Light" panose="020F0302020204030204" pitchFamily="34" charset="0"/>
+            </a:endParaRPr>
+          </a:p>
+          <a:p>
+            <a:endParaRPr lang="en-US" sz="2000" b="1" dirty="0">
+              <a:latin typeface="Calibri Light" panose="020F0302020204030204" pitchFamily="34" charset="0"/>
+              <a:cs typeface="Calibri Light" panose="020F0302020204030204" pitchFamily="34" charset="0"/>
+            </a:endParaRPr>
+          </a:p>
+          <a:p>
+            <a:endParaRPr lang="en-IN" sz="2000" b="1" dirty="0">
+              <a:latin typeface="Calibri Light" panose="020F0302020204030204" pitchFamily="34" charset="0"/>
+              <a:cs typeface="Calibri Light" panose="020F0302020204030204" pitchFamily="34" charset="0"/>
+            </a:endParaRPr>
+          </a:p>
+          <a:p>
+            <a:endParaRPr lang="en-IN" sz="2000" b="1" dirty="0">
+              <a:latin typeface="Calibri Light" panose="020F0302020204030204" pitchFamily="34" charset="0"/>
+              <a:cs typeface="Calibri Light" panose="020F0302020204030204" pitchFamily="34" charset="0"/>
+            </a:endParaRPr>
           </a:p>
         </p:txBody>
       </p:sp>
       <p:pic>
         <p:nvPicPr>
-          <p:cNvPr id="7" name="Picture 6">
-            <a:extLst>
-              <a:ext uri="{FF2B5EF4-FFF2-40B4-BE49-F238E27FC236}">
-                <a16:creationId xmlns:a16="http://schemas.microsoft.com/office/drawing/2014/main" id="{5062A7CB-300C-1E4D-C106-6669C58871E6}"/>
+          <p:cNvPr id="5" name="Picture 4" descr="Chart, scatter chart&#10;&#10;Description automatically generated">
+            <a:extLst>
+              <a:ext uri="{FF2B5EF4-FFF2-40B4-BE49-F238E27FC236}">
+                <a16:creationId xmlns:a16="http://schemas.microsoft.com/office/drawing/2014/main" id="{58DD720B-4466-C981-BC70-D14004C56DAA}"/>
               </a:ext>
             </a:extLst>
           </p:cNvPr>
@@ -7731,181 +7422,31 @@
           <p:nvPr/>
         </p:nvPicPr>
         <p:blipFill>
-          <a:blip r:embed="rId2"/>
+          <a:blip r:embed="rId2">
+            <a:extLst>
+              <a:ext uri="{28A0092B-C50C-407E-A947-70E740481C1C}">
+                <a14:useLocalDpi xmlns:a14="http://schemas.microsoft.com/office/drawing/2010/main" val="0"/>
+              </a:ext>
+            </a:extLst>
+          </a:blip>
           <a:stretch>
             <a:fillRect/>
           </a:stretch>
         </p:blipFill>
         <p:spPr>
           <a:xfrm>
-            <a:off x="3363266" y="5871229"/>
-            <a:ext cx="4293418" cy="969576"/>
+            <a:off x="6096000" y="3538010"/>
+            <a:ext cx="4419600" cy="2352912"/>
           </a:xfrm>
           <a:prstGeom prst="rect">
             <a:avLst/>
           </a:prstGeom>
         </p:spPr>
       </p:pic>
-      <p:pic>
-        <p:nvPicPr>
-          <p:cNvPr id="9" name="Picture 8">
-            <a:extLst>
-              <a:ext uri="{FF2B5EF4-FFF2-40B4-BE49-F238E27FC236}">
-                <a16:creationId xmlns:a16="http://schemas.microsoft.com/office/drawing/2014/main" id="{CA1EC61F-9AF8-4799-81C7-FEE51BD75934}"/>
-              </a:ext>
-            </a:extLst>
-          </p:cNvPr>
-          <p:cNvPicPr>
-            <a:picLocks noChangeAspect="1"/>
-          </p:cNvPicPr>
-          <p:nvPr/>
-        </p:nvPicPr>
-        <p:blipFill>
-          <a:blip r:embed="rId3"/>
-          <a:stretch>
-            <a:fillRect/>
-          </a:stretch>
-        </p:blipFill>
-        <p:spPr>
-          <a:xfrm>
-            <a:off x="685388" y="864450"/>
-            <a:ext cx="4012229" cy="2364748"/>
-          </a:xfrm>
-          <a:prstGeom prst="rect">
-            <a:avLst/>
-          </a:prstGeom>
-        </p:spPr>
-      </p:pic>
-      <p:pic>
-        <p:nvPicPr>
-          <p:cNvPr id="11" name="Picture 10">
-            <a:extLst>
-              <a:ext uri="{FF2B5EF4-FFF2-40B4-BE49-F238E27FC236}">
-                <a16:creationId xmlns:a16="http://schemas.microsoft.com/office/drawing/2014/main" id="{9EFFC309-6A8B-4F05-1D63-349E71E98E77}"/>
-              </a:ext>
-            </a:extLst>
-          </p:cNvPr>
-          <p:cNvPicPr>
-            <a:picLocks noChangeAspect="1"/>
-          </p:cNvPicPr>
-          <p:nvPr/>
-        </p:nvPicPr>
-        <p:blipFill>
-          <a:blip r:embed="rId4"/>
-          <a:stretch>
-            <a:fillRect/>
-          </a:stretch>
-        </p:blipFill>
-        <p:spPr>
-          <a:xfrm>
-            <a:off x="685388" y="3330930"/>
-            <a:ext cx="4293418" cy="2498096"/>
-          </a:xfrm>
-          <a:prstGeom prst="rect">
-            <a:avLst/>
-          </a:prstGeom>
-        </p:spPr>
-      </p:pic>
-      <p:pic>
-        <p:nvPicPr>
-          <p:cNvPr id="17" name="Picture 16">
-            <a:extLst>
-              <a:ext uri="{FF2B5EF4-FFF2-40B4-BE49-F238E27FC236}">
-                <a16:creationId xmlns:a16="http://schemas.microsoft.com/office/drawing/2014/main" id="{BBBC5877-51B1-1F9D-81CB-C5DC03F569C7}"/>
-              </a:ext>
-            </a:extLst>
-          </p:cNvPr>
-          <p:cNvPicPr>
-            <a:picLocks noChangeAspect="1"/>
-          </p:cNvPicPr>
-          <p:nvPr/>
-        </p:nvPicPr>
-        <p:blipFill>
-          <a:blip r:embed="rId5"/>
-          <a:stretch>
-            <a:fillRect/>
-          </a:stretch>
-        </p:blipFill>
-        <p:spPr>
-          <a:xfrm>
-            <a:off x="6103007" y="864450"/>
-            <a:ext cx="4078743" cy="2466480"/>
-          </a:xfrm>
-          <a:prstGeom prst="rect">
-            <a:avLst/>
-          </a:prstGeom>
-        </p:spPr>
-      </p:pic>
-      <p:pic>
-        <p:nvPicPr>
-          <p:cNvPr id="19" name="Picture 18">
-            <a:extLst>
-              <a:ext uri="{FF2B5EF4-FFF2-40B4-BE49-F238E27FC236}">
-                <a16:creationId xmlns:a16="http://schemas.microsoft.com/office/drawing/2014/main" id="{F56AAC6C-2BDB-A283-BC92-B37C41CEFA1F}"/>
-              </a:ext>
-            </a:extLst>
-          </p:cNvPr>
-          <p:cNvPicPr>
-            <a:picLocks noChangeAspect="1"/>
-          </p:cNvPicPr>
-          <p:nvPr/>
-        </p:nvPicPr>
-        <p:blipFill>
-          <a:blip r:embed="rId6"/>
-          <a:stretch>
-            <a:fillRect/>
-          </a:stretch>
-        </p:blipFill>
-        <p:spPr>
-          <a:xfrm>
-            <a:off x="6096000" y="3246560"/>
-            <a:ext cx="4402856" cy="2646493"/>
-          </a:xfrm>
-          <a:prstGeom prst="rect">
-            <a:avLst/>
-          </a:prstGeom>
-        </p:spPr>
-      </p:pic>
-      <p:cxnSp>
-        <p:nvCxnSpPr>
-          <p:cNvPr id="5" name="Straight Connector 4">
-            <a:extLst>
-              <a:ext uri="{FF2B5EF4-FFF2-40B4-BE49-F238E27FC236}">
-                <a16:creationId xmlns:a16="http://schemas.microsoft.com/office/drawing/2014/main" id="{EF2AB39F-F758-726B-4F20-359A8313E675}"/>
-              </a:ext>
-            </a:extLst>
-          </p:cNvPr>
-          <p:cNvCxnSpPr/>
-          <p:nvPr/>
-        </p:nvCxnSpPr>
-        <p:spPr>
-          <a:xfrm>
-            <a:off x="5509975" y="555358"/>
-            <a:ext cx="0" cy="5083442"/>
-          </a:xfrm>
-          <a:prstGeom prst="line">
-            <a:avLst/>
-          </a:prstGeom>
-        </p:spPr>
-        <p:style>
-          <a:lnRef idx="1">
-            <a:schemeClr val="accent1"/>
-          </a:lnRef>
-          <a:fillRef idx="0">
-            <a:schemeClr val="accent1"/>
-          </a:fillRef>
-          <a:effectRef idx="0">
-            <a:schemeClr val="accent1"/>
-          </a:effectRef>
-          <a:fontRef idx="minor">
-            <a:schemeClr val="tx1"/>
-          </a:fontRef>
-        </p:style>
-      </p:cxnSp>
     </p:spTree>
     <p:extLst>
       <p:ext uri="{BB962C8B-B14F-4D97-AF65-F5344CB8AC3E}">
-        <p14:creationId xmlns:p14="http://schemas.microsoft.com/office/powerpoint/2010/main" val="841477307"/>
+        <p14:creationId xmlns:p14="http://schemas.microsoft.com/office/powerpoint/2010/main" val="4106631437"/>
       </p:ext>
     </p:extLst>
   </p:cSld>
@@ -7937,7 +7478,7 @@
           <p:cNvPr id="2" name="Title 1">
             <a:extLst>
               <a:ext uri="{FF2B5EF4-FFF2-40B4-BE49-F238E27FC236}">
-                <a16:creationId xmlns:a16="http://schemas.microsoft.com/office/drawing/2014/main" id="{F453E7CA-6BA4-AE64-5325-47E0EB9A20BA}"/>
+                <a16:creationId xmlns:a16="http://schemas.microsoft.com/office/drawing/2014/main" id="{EEEEF9C9-55DC-5403-875C-001F30EED9B1}"/>
               </a:ext>
             </a:extLst>
           </p:cNvPr>
@@ -7950,623 +7491,31 @@
         </p:nvSpPr>
         <p:spPr>
           <a:xfrm>
-            <a:off x="838200" y="365126"/>
-            <a:ext cx="10515600" cy="773864"/>
-          </a:xfrm>
-        </p:spPr>
-        <p:txBody>
-          <a:bodyPr>
+            <a:off x="643467" y="321734"/>
+            <a:ext cx="10905066" cy="1135737"/>
+          </a:xfrm>
+        </p:spPr>
+        <p:txBody>
+          <a:bodyPr vert="horz" lIns="91440" tIns="45720" rIns="91440" bIns="45720" rtlCol="0" anchor="ctr">
             <a:normAutofit/>
           </a:bodyPr>
           <a:lstStyle/>
           <a:p>
             <a:r>
-              <a:rPr lang="en-IN" sz="3200" b="1" dirty="0">
+              <a:rPr lang="en-US" sz="3000" b="1" dirty="0">
                 <a:latin typeface="+mn-lt"/>
               </a:rPr>
-              <a:t>Summary of Model Results:</a:t>
-            </a:r>
-          </a:p>
-        </p:txBody>
-      </p:sp>
-      <p:graphicFrame>
-        <p:nvGraphicFramePr>
-          <p:cNvPr id="4" name="Table 4">
-            <a:extLst>
-              <a:ext uri="{FF2B5EF4-FFF2-40B4-BE49-F238E27FC236}">
-                <a16:creationId xmlns:a16="http://schemas.microsoft.com/office/drawing/2014/main" id="{7677C3FE-5721-DA8C-3228-0FA0606EA12A}"/>
-              </a:ext>
-            </a:extLst>
-          </p:cNvPr>
-          <p:cNvGraphicFramePr>
-            <a:graphicFrameLocks noGrp="1"/>
-          </p:cNvGraphicFramePr>
-          <p:nvPr>
-            <p:ph idx="1"/>
-          </p:nvPr>
-        </p:nvGraphicFramePr>
-        <p:xfrm>
-          <a:off x="838200" y="1491916"/>
-          <a:ext cx="10515600" cy="3577387"/>
-        </p:xfrm>
-        <a:graphic>
-          <a:graphicData uri="http://schemas.openxmlformats.org/drawingml/2006/table">
-            <a:tbl>
-              <a:tblPr firstRow="1" bandRow="1">
-                <a:tableStyleId>{5C22544A-7EE6-4342-B048-85BDC9FD1C3A}</a:tableStyleId>
-              </a:tblPr>
-              <a:tblGrid>
-                <a:gridCol w="2103120">
-                  <a:extLst>
-                    <a:ext uri="{9D8B030D-6E8A-4147-A177-3AD203B41FA5}">
-                      <a16:colId xmlns:a16="http://schemas.microsoft.com/office/drawing/2014/main" val="2802901101"/>
-                    </a:ext>
-                  </a:extLst>
-                </a:gridCol>
-                <a:gridCol w="2103120">
-                  <a:extLst>
-                    <a:ext uri="{9D8B030D-6E8A-4147-A177-3AD203B41FA5}">
-                      <a16:colId xmlns:a16="http://schemas.microsoft.com/office/drawing/2014/main" val="351254930"/>
-                    </a:ext>
-                  </a:extLst>
-                </a:gridCol>
-                <a:gridCol w="2103120">
-                  <a:extLst>
-                    <a:ext uri="{9D8B030D-6E8A-4147-A177-3AD203B41FA5}">
-                      <a16:colId xmlns:a16="http://schemas.microsoft.com/office/drawing/2014/main" val="3437466710"/>
-                    </a:ext>
-                  </a:extLst>
-                </a:gridCol>
-                <a:gridCol w="2103120">
-                  <a:extLst>
-                    <a:ext uri="{9D8B030D-6E8A-4147-A177-3AD203B41FA5}">
-                      <a16:colId xmlns:a16="http://schemas.microsoft.com/office/drawing/2014/main" val="2993918040"/>
-                    </a:ext>
-                  </a:extLst>
-                </a:gridCol>
-                <a:gridCol w="2103120">
-                  <a:extLst>
-                    <a:ext uri="{9D8B030D-6E8A-4147-A177-3AD203B41FA5}">
-                      <a16:colId xmlns:a16="http://schemas.microsoft.com/office/drawing/2014/main" val="1594398749"/>
-                    </a:ext>
-                  </a:extLst>
-                </a:gridCol>
-              </a:tblGrid>
-              <a:tr h="787928">
-                <a:tc>
-                  <a:txBody>
-                    <a:bodyPr/>
-                    <a:lstStyle/>
-                    <a:p>
-                      <a:r>
-                        <a:rPr lang="en-IN" dirty="0"/>
-                        <a:t>Model(Algorithm)</a:t>
-                      </a:r>
-                    </a:p>
-                  </a:txBody>
-                  <a:tcPr/>
-                </a:tc>
-                <a:tc>
-                  <a:txBody>
-                    <a:bodyPr/>
-                    <a:lstStyle/>
-                    <a:p>
-                      <a:r>
-                        <a:rPr lang="en-IN" dirty="0"/>
-                        <a:t>R-squared(Train)</a:t>
-                      </a:r>
-                    </a:p>
-                  </a:txBody>
-                  <a:tcPr/>
-                </a:tc>
-                <a:tc>
-                  <a:txBody>
-                    <a:bodyPr/>
-                    <a:lstStyle/>
-                    <a:p>
-                      <a:pPr marL="0" marR="0" lvl="0" indent="0" algn="l" defTabSz="914400" rtl="0" eaLnBrk="1" fontAlgn="auto" latinLnBrk="0" hangingPunct="1">
-                        <a:lnSpc>
-                          <a:spcPct val="100000"/>
-                        </a:lnSpc>
-                        <a:spcBef>
-                          <a:spcPts val="0"/>
-                        </a:spcBef>
-                        <a:spcAft>
-                          <a:spcPts val="0"/>
-                        </a:spcAft>
-                        <a:buClrTx/>
-                        <a:buSzTx/>
-                        <a:buFontTx/>
-                        <a:buNone/>
-                        <a:tabLst/>
-                        <a:defRPr/>
-                      </a:pPr>
-                      <a:r>
-                        <a:rPr lang="en-IN" dirty="0"/>
-                        <a:t>R-squared(Test)</a:t>
-                      </a:r>
-                    </a:p>
-                  </a:txBody>
-                  <a:tcPr/>
-                </a:tc>
-                <a:tc>
-                  <a:txBody>
-                    <a:bodyPr/>
-                    <a:lstStyle/>
-                    <a:p>
-                      <a:r>
-                        <a:rPr lang="en-IN" dirty="0"/>
-                        <a:t>RMSE(Train)</a:t>
-                      </a:r>
-                    </a:p>
-                  </a:txBody>
-                  <a:tcPr/>
-                </a:tc>
-                <a:tc>
-                  <a:txBody>
-                    <a:bodyPr/>
-                    <a:lstStyle/>
-                    <a:p>
-                      <a:r>
-                        <a:rPr lang="en-IN" dirty="0"/>
-                        <a:t>RMSE(Test)</a:t>
-                      </a:r>
-                    </a:p>
-                  </a:txBody>
-                  <a:tcPr/>
-                </a:tc>
-                <a:extLst>
-                  <a:ext uri="{0D108BD9-81ED-4DB2-BD59-A6C34878D82A}">
-                    <a16:rowId xmlns:a16="http://schemas.microsoft.com/office/drawing/2014/main" val="2515094857"/>
-                  </a:ext>
-                </a:extLst>
-              </a:tr>
-              <a:tr h="414726">
-                <a:tc>
-                  <a:txBody>
-                    <a:bodyPr/>
-                    <a:lstStyle/>
-                    <a:p>
-                      <a:r>
-                        <a:rPr lang="en-IN" dirty="0"/>
-                        <a:t>Linear Regression</a:t>
-                      </a:r>
-                    </a:p>
-                  </a:txBody>
-                  <a:tcPr/>
-                </a:tc>
-                <a:tc>
-                  <a:txBody>
-                    <a:bodyPr/>
-                    <a:lstStyle/>
-                    <a:p>
-                      <a:r>
-                        <a:rPr lang="en-IN" dirty="0"/>
-                        <a:t>75.58%</a:t>
-                      </a:r>
-                    </a:p>
-                  </a:txBody>
-                  <a:tcPr/>
-                </a:tc>
-                <a:tc>
-                  <a:txBody>
-                    <a:bodyPr/>
-                    <a:lstStyle/>
-                    <a:p>
-                      <a:r>
-                        <a:rPr lang="en-IN" dirty="0"/>
-                        <a:t>74.65%</a:t>
-                      </a:r>
-                    </a:p>
-                  </a:txBody>
-                  <a:tcPr/>
-                </a:tc>
-                <a:tc>
-                  <a:txBody>
-                    <a:bodyPr/>
-                    <a:lstStyle/>
-                    <a:p>
-                      <a:r>
-                        <a:rPr lang="en-IN" dirty="0"/>
-                        <a:t>0.4933</a:t>
-                      </a:r>
-                    </a:p>
-                  </a:txBody>
-                  <a:tcPr/>
-                </a:tc>
-                <a:tc>
-                  <a:txBody>
-                    <a:bodyPr/>
-                    <a:lstStyle/>
-                    <a:p>
-                      <a:r>
-                        <a:rPr lang="en-IN" dirty="0"/>
-                        <a:t>0.5070</a:t>
-                      </a:r>
-                    </a:p>
-                  </a:txBody>
-                  <a:tcPr/>
-                </a:tc>
-                <a:extLst>
-                  <a:ext uri="{0D108BD9-81ED-4DB2-BD59-A6C34878D82A}">
-                    <a16:rowId xmlns:a16="http://schemas.microsoft.com/office/drawing/2014/main" val="3380751878"/>
-                  </a:ext>
-                </a:extLst>
-              </a:tr>
-              <a:tr h="414726">
-                <a:tc>
-                  <a:txBody>
-                    <a:bodyPr/>
-                    <a:lstStyle/>
-                    <a:p>
-                      <a:r>
-                        <a:rPr lang="en-IN" dirty="0"/>
-                        <a:t>Lasso Regression</a:t>
-                      </a:r>
-                    </a:p>
-                  </a:txBody>
-                  <a:tcPr/>
-                </a:tc>
-                <a:tc>
-                  <a:txBody>
-                    <a:bodyPr/>
-                    <a:lstStyle/>
-                    <a:p>
-                      <a:r>
-                        <a:rPr lang="en-IN" dirty="0"/>
-                        <a:t>75.84%</a:t>
-                      </a:r>
-                    </a:p>
-                  </a:txBody>
-                  <a:tcPr/>
-                </a:tc>
-                <a:tc>
-                  <a:txBody>
-                    <a:bodyPr/>
-                    <a:lstStyle/>
-                    <a:p>
-                      <a:r>
-                        <a:rPr lang="en-IN" dirty="0"/>
-                        <a:t>73.58%</a:t>
-                      </a:r>
-                    </a:p>
-                  </a:txBody>
-                  <a:tcPr/>
-                </a:tc>
-                <a:tc>
-                  <a:txBody>
-                    <a:bodyPr/>
-                    <a:lstStyle/>
-                    <a:p>
-                      <a:r>
-                        <a:rPr lang="en-IN" dirty="0"/>
-                        <a:t>0.4897</a:t>
-                      </a:r>
-                    </a:p>
-                  </a:txBody>
-                  <a:tcPr/>
-                </a:tc>
-                <a:tc>
-                  <a:txBody>
-                    <a:bodyPr/>
-                    <a:lstStyle/>
-                    <a:p>
-                      <a:r>
-                        <a:rPr lang="en-IN" dirty="0"/>
-                        <a:t>0.5212</a:t>
-                      </a:r>
-                    </a:p>
-                  </a:txBody>
-                  <a:tcPr/>
-                </a:tc>
-                <a:extLst>
-                  <a:ext uri="{0D108BD9-81ED-4DB2-BD59-A6C34878D82A}">
-                    <a16:rowId xmlns:a16="http://schemas.microsoft.com/office/drawing/2014/main" val="765008775"/>
-                  </a:ext>
-                </a:extLst>
-              </a:tr>
-              <a:tr h="414726">
-                <a:tc>
-                  <a:txBody>
-                    <a:bodyPr/>
-                    <a:lstStyle/>
-                    <a:p>
-                      <a:r>
-                        <a:rPr lang="en-IN" dirty="0"/>
-                        <a:t>Ridge Regression</a:t>
-                      </a:r>
-                    </a:p>
-                  </a:txBody>
-                  <a:tcPr/>
-                </a:tc>
-                <a:tc>
-                  <a:txBody>
-                    <a:bodyPr/>
-                    <a:lstStyle/>
-                    <a:p>
-                      <a:r>
-                        <a:rPr lang="en-IN" dirty="0"/>
-                        <a:t>75.64%</a:t>
-                      </a:r>
-                    </a:p>
-                  </a:txBody>
-                  <a:tcPr/>
-                </a:tc>
-                <a:tc>
-                  <a:txBody>
-                    <a:bodyPr/>
-                    <a:lstStyle/>
-                    <a:p>
-                      <a:r>
-                        <a:rPr lang="en-IN" dirty="0"/>
-                        <a:t>73.51%</a:t>
-                      </a:r>
-                    </a:p>
-                  </a:txBody>
-                  <a:tcPr/>
-                </a:tc>
-                <a:tc>
-                  <a:txBody>
-                    <a:bodyPr/>
-                    <a:lstStyle/>
-                    <a:p>
-                      <a:r>
-                        <a:rPr lang="en-IN" dirty="0"/>
-                        <a:t>0.4924</a:t>
-                      </a:r>
-                    </a:p>
-                  </a:txBody>
-                  <a:tcPr/>
-                </a:tc>
-                <a:tc>
-                  <a:txBody>
-                    <a:bodyPr/>
-                    <a:lstStyle/>
-                    <a:p>
-                      <a:r>
-                        <a:rPr lang="en-IN" dirty="0"/>
-                        <a:t>0.5226</a:t>
-                      </a:r>
-                    </a:p>
-                  </a:txBody>
-                  <a:tcPr/>
-                </a:tc>
-                <a:extLst>
-                  <a:ext uri="{0D108BD9-81ED-4DB2-BD59-A6C34878D82A}">
-                    <a16:rowId xmlns:a16="http://schemas.microsoft.com/office/drawing/2014/main" val="615029044"/>
-                  </a:ext>
-                </a:extLst>
-              </a:tr>
-              <a:tr h="414726">
-                <a:tc>
-                  <a:txBody>
-                    <a:bodyPr/>
-                    <a:lstStyle/>
-                    <a:p>
-                      <a:r>
-                        <a:rPr lang="en-IN" dirty="0"/>
-                        <a:t>SVM Regressor</a:t>
-                      </a:r>
-                    </a:p>
-                  </a:txBody>
-                  <a:tcPr/>
-                </a:tc>
-                <a:tc>
-                  <a:txBody>
-                    <a:bodyPr/>
-                    <a:lstStyle/>
-                    <a:p>
-                      <a:r>
-                        <a:rPr lang="en-IN" dirty="0"/>
-                        <a:t>88.04%</a:t>
-                      </a:r>
-                    </a:p>
-                  </a:txBody>
-                  <a:tcPr/>
-                </a:tc>
-                <a:tc>
-                  <a:txBody>
-                    <a:bodyPr/>
-                    <a:lstStyle/>
-                    <a:p>
-                      <a:r>
-                        <a:rPr lang="en-IN" dirty="0"/>
-                        <a:t>88.92%</a:t>
-                      </a:r>
-                    </a:p>
-                  </a:txBody>
-                  <a:tcPr/>
-                </a:tc>
-                <a:tc>
-                  <a:txBody>
-                    <a:bodyPr/>
-                    <a:lstStyle/>
-                    <a:p>
-                      <a:r>
-                        <a:rPr lang="en-IN" dirty="0"/>
-                        <a:t>0.3615</a:t>
-                      </a:r>
-                    </a:p>
-                  </a:txBody>
-                  <a:tcPr/>
-                </a:tc>
-                <a:tc>
-                  <a:txBody>
-                    <a:bodyPr/>
-                    <a:lstStyle/>
-                    <a:p>
-                      <a:r>
-                        <a:rPr lang="en-IN" dirty="0"/>
-                        <a:t>0.3415</a:t>
-                      </a:r>
-                    </a:p>
-                  </a:txBody>
-                  <a:tcPr/>
-                </a:tc>
-                <a:extLst>
-                  <a:ext uri="{0D108BD9-81ED-4DB2-BD59-A6C34878D82A}">
-                    <a16:rowId xmlns:a16="http://schemas.microsoft.com/office/drawing/2014/main" val="2951312833"/>
-                  </a:ext>
-                </a:extLst>
-              </a:tr>
-              <a:tr h="715829">
-                <a:tc>
-                  <a:txBody>
-                    <a:bodyPr/>
-                    <a:lstStyle/>
-                    <a:p>
-                      <a:r>
-                        <a:rPr lang="en-IN" dirty="0"/>
-                        <a:t>Random Forest Regressor</a:t>
-                      </a:r>
-                    </a:p>
-                  </a:txBody>
-                  <a:tcPr/>
-                </a:tc>
-                <a:tc>
-                  <a:txBody>
-                    <a:bodyPr/>
-                    <a:lstStyle/>
-                    <a:p>
-                      <a:r>
-                        <a:rPr lang="en-IN" dirty="0"/>
-                        <a:t>97.87%</a:t>
-                      </a:r>
-                    </a:p>
-                  </a:txBody>
-                  <a:tcPr/>
-                </a:tc>
-                <a:tc>
-                  <a:txBody>
-                    <a:bodyPr/>
-                    <a:lstStyle/>
-                    <a:p>
-                      <a:r>
-                        <a:rPr lang="en-IN" dirty="0"/>
-                        <a:t>90.64%</a:t>
-                      </a:r>
-                    </a:p>
-                  </a:txBody>
-                  <a:tcPr/>
-                </a:tc>
-                <a:tc>
-                  <a:txBody>
-                    <a:bodyPr/>
-                    <a:lstStyle/>
-                    <a:p>
-                      <a:r>
-                        <a:rPr lang="en-IN" dirty="0"/>
-                        <a:t>0.1511</a:t>
-                      </a:r>
-                    </a:p>
-                  </a:txBody>
-                  <a:tcPr/>
-                </a:tc>
-                <a:tc>
-                  <a:txBody>
-                    <a:bodyPr/>
-                    <a:lstStyle/>
-                    <a:p>
-                      <a:r>
-                        <a:rPr lang="en-IN" dirty="0"/>
-                        <a:t>0.3116</a:t>
-                      </a:r>
-                    </a:p>
-                  </a:txBody>
-                  <a:tcPr/>
-                </a:tc>
-                <a:extLst>
-                  <a:ext uri="{0D108BD9-81ED-4DB2-BD59-A6C34878D82A}">
-                    <a16:rowId xmlns:a16="http://schemas.microsoft.com/office/drawing/2014/main" val="3250272351"/>
-                  </a:ext>
-                </a:extLst>
-              </a:tr>
-              <a:tr h="414726">
-                <a:tc>
-                  <a:txBody>
-                    <a:bodyPr/>
-                    <a:lstStyle/>
-                    <a:p>
-                      <a:r>
-                        <a:rPr lang="en-IN" dirty="0" err="1"/>
-                        <a:t>XGBoost</a:t>
-                      </a:r>
-                      <a:r>
-                        <a:rPr lang="en-IN" dirty="0"/>
-                        <a:t> Regressor</a:t>
-                      </a:r>
-                    </a:p>
-                  </a:txBody>
-                  <a:tcPr/>
-                </a:tc>
-                <a:tc>
-                  <a:txBody>
-                    <a:bodyPr/>
-                    <a:lstStyle/>
-                    <a:p>
-                      <a:r>
-                        <a:rPr lang="en-IN" dirty="0"/>
-                        <a:t>96.56%</a:t>
-                      </a:r>
-                    </a:p>
-                  </a:txBody>
-                  <a:tcPr/>
-                </a:tc>
-                <a:tc>
-                  <a:txBody>
-                    <a:bodyPr/>
-                    <a:lstStyle/>
-                    <a:p>
-                      <a:r>
-                        <a:rPr lang="en-IN" dirty="0"/>
-                        <a:t>92.73%</a:t>
-                      </a:r>
-                    </a:p>
-                  </a:txBody>
-                  <a:tcPr/>
-                </a:tc>
-                <a:tc>
-                  <a:txBody>
-                    <a:bodyPr/>
-                    <a:lstStyle/>
-                    <a:p>
-                      <a:r>
-                        <a:rPr lang="en-IN" dirty="0"/>
-                        <a:t>0.1859</a:t>
-                      </a:r>
-                    </a:p>
-                  </a:txBody>
-                  <a:tcPr/>
-                </a:tc>
-                <a:tc>
-                  <a:txBody>
-                    <a:bodyPr/>
-                    <a:lstStyle/>
-                    <a:p>
-                      <a:r>
-                        <a:rPr lang="en-IN" dirty="0"/>
-                        <a:t>0.2688</a:t>
-                      </a:r>
-                    </a:p>
-                  </a:txBody>
-                  <a:tcPr/>
-                </a:tc>
-                <a:extLst>
-                  <a:ext uri="{0D108BD9-81ED-4DB2-BD59-A6C34878D82A}">
-                    <a16:rowId xmlns:a16="http://schemas.microsoft.com/office/drawing/2014/main" val="2285796489"/>
-                  </a:ext>
-                </a:extLst>
-              </a:tr>
-            </a:tbl>
-          </a:graphicData>
-        </a:graphic>
-      </p:graphicFrame>
-      <p:sp>
-        <p:nvSpPr>
-          <p:cNvPr id="5" name="TextBox 4">
-            <a:extLst>
-              <a:ext uri="{FF2B5EF4-FFF2-40B4-BE49-F238E27FC236}">
-                <a16:creationId xmlns:a16="http://schemas.microsoft.com/office/drawing/2014/main" id="{FF234027-3B78-D44E-0FBC-A7940AD3BCE6}"/>
+              <a:t>SVM Regressor: Results</a:t>
+            </a:r>
+          </a:p>
+        </p:txBody>
+      </p:sp>
+      <p:sp>
+        <p:nvSpPr>
+          <p:cNvPr id="6" name="TextBox 5">
+            <a:extLst>
+              <a:ext uri="{FF2B5EF4-FFF2-40B4-BE49-F238E27FC236}">
+                <a16:creationId xmlns:a16="http://schemas.microsoft.com/office/drawing/2014/main" id="{0E1DE864-D1A2-45E8-F057-5EFA137B9E8E}"/>
               </a:ext>
             </a:extLst>
           </p:cNvPr>
@@ -8575,37 +7524,158 @@
         </p:nvSpPr>
         <p:spPr>
           <a:xfrm>
-            <a:off x="838200" y="5422229"/>
-            <a:ext cx="9787636" cy="1323439"/>
+            <a:off x="643469" y="1782981"/>
+            <a:ext cx="4008384" cy="4393982"/>
           </a:xfrm>
           <a:prstGeom prst="rect">
             <a:avLst/>
           </a:prstGeom>
-          <a:noFill/>
-        </p:spPr>
-        <p:txBody>
-          <a:bodyPr wrap="square" rtlCol="0">
-            <a:spAutoFit/>
+        </p:spPr>
+        <p:txBody>
+          <a:bodyPr vert="horz" lIns="91440" tIns="45720" rIns="91440" bIns="45720" rtlCol="0">
+            <a:normAutofit/>
           </a:bodyPr>
           <a:lstStyle/>
           <a:p>
-            <a:r>
-              <a:rPr lang="en-IN" sz="2000" dirty="0"/>
-              <a:t>The linear regression model performed significantly well and there is not much difference observed in the case of lasso and Ridge.</a:t>
-            </a:r>
-          </a:p>
-          <a:p>
-            <a:r>
-              <a:rPr lang="en-IN" sz="2000" dirty="0"/>
-              <a:t>Bagging and boosting regressors did very well and we got test R-squared above 90% with minimum RMSE compared to other models.</a:t>
-            </a:r>
-          </a:p>
-        </p:txBody>
-      </p:sp>
+            <a:pPr marL="285750" indent="-228600">
+              <a:lnSpc>
+                <a:spcPct val="90000"/>
+              </a:lnSpc>
+              <a:spcAft>
+                <a:spcPts val="600"/>
+              </a:spcAft>
+              <a:buFont typeface="Arial" panose="020B0604020202020204" pitchFamily="34" charset="0"/>
+              <a:buChar char="•"/>
+            </a:pPr>
+            <a:r>
+              <a:rPr lang="en-US" dirty="0" err="1"/>
+              <a:t>Svm</a:t>
+            </a:r>
+            <a:r>
+              <a:rPr lang="en-US" dirty="0"/>
+              <a:t> model is passed with the best features .</a:t>
+            </a:r>
+          </a:p>
+          <a:p>
+            <a:pPr marL="285750" indent="-228600">
+              <a:lnSpc>
+                <a:spcPct val="90000"/>
+              </a:lnSpc>
+              <a:spcAft>
+                <a:spcPts val="600"/>
+              </a:spcAft>
+              <a:buFont typeface="Arial" panose="020B0604020202020204" pitchFamily="34" charset="0"/>
+              <a:buChar char="•"/>
+            </a:pPr>
+            <a:r>
+              <a:rPr lang="en-US" dirty="0"/>
+              <a:t>The RMSE and </a:t>
+            </a:r>
+            <a:r>
+              <a:rPr lang="en-US" dirty="0" err="1"/>
+              <a:t>Rsquared</a:t>
+            </a:r>
+            <a:r>
+              <a:rPr lang="en-US" dirty="0"/>
+              <a:t> values for the test ad train data is shown </a:t>
+            </a:r>
+          </a:p>
+        </p:txBody>
+      </p:sp>
+      <p:pic>
+        <p:nvPicPr>
+          <p:cNvPr id="5" name="Picture 4">
+            <a:extLst>
+              <a:ext uri="{FF2B5EF4-FFF2-40B4-BE49-F238E27FC236}">
+                <a16:creationId xmlns:a16="http://schemas.microsoft.com/office/drawing/2014/main" id="{DD6EAFE1-0CF6-39DC-3EAC-514B715D4539}"/>
+              </a:ext>
+            </a:extLst>
+          </p:cNvPr>
+          <p:cNvPicPr>
+            <a:picLocks noChangeAspect="1"/>
+          </p:cNvPicPr>
+          <p:nvPr/>
+        </p:nvPicPr>
+        <p:blipFill>
+          <a:blip r:embed="rId2"/>
+          <a:stretch>
+            <a:fillRect/>
+          </a:stretch>
+        </p:blipFill>
+        <p:spPr>
+          <a:xfrm>
+            <a:off x="5295320" y="4317307"/>
+            <a:ext cx="6253212" cy="1570665"/>
+          </a:xfrm>
+          <a:prstGeom prst="rect">
+            <a:avLst/>
+          </a:prstGeom>
+        </p:spPr>
+      </p:pic>
+      <p:pic>
+        <p:nvPicPr>
+          <p:cNvPr id="3" name="Picture 2">
+            <a:extLst>
+              <a:ext uri="{FF2B5EF4-FFF2-40B4-BE49-F238E27FC236}">
+                <a16:creationId xmlns:a16="http://schemas.microsoft.com/office/drawing/2014/main" id="{0C01ED45-109C-15D0-DE70-96BEAF24A4F0}"/>
+              </a:ext>
+            </a:extLst>
+          </p:cNvPr>
+          <p:cNvPicPr>
+            <a:picLocks noChangeAspect="1"/>
+          </p:cNvPicPr>
+          <p:nvPr/>
+        </p:nvPicPr>
+        <p:blipFill>
+          <a:blip r:embed="rId3"/>
+          <a:stretch>
+            <a:fillRect/>
+          </a:stretch>
+        </p:blipFill>
+        <p:spPr>
+          <a:xfrm>
+            <a:off x="5295320" y="1515727"/>
+            <a:ext cx="5802171" cy="1024965"/>
+          </a:xfrm>
+          <a:prstGeom prst="rect">
+            <a:avLst/>
+          </a:prstGeom>
+        </p:spPr>
+      </p:pic>
+      <p:pic>
+        <p:nvPicPr>
+          <p:cNvPr id="7" name="Picture 6">
+            <a:extLst>
+              <a:ext uri="{FF2B5EF4-FFF2-40B4-BE49-F238E27FC236}">
+                <a16:creationId xmlns:a16="http://schemas.microsoft.com/office/drawing/2014/main" id="{8D81B251-2277-FDE0-964C-1098D635B2F3}"/>
+              </a:ext>
+            </a:extLst>
+          </p:cNvPr>
+          <p:cNvPicPr>
+            <a:picLocks noChangeAspect="1"/>
+          </p:cNvPicPr>
+          <p:nvPr/>
+        </p:nvPicPr>
+        <p:blipFill>
+          <a:blip r:embed="rId4"/>
+          <a:stretch>
+            <a:fillRect/>
+          </a:stretch>
+        </p:blipFill>
+        <p:spPr>
+          <a:xfrm>
+            <a:off x="5295320" y="2707322"/>
+            <a:ext cx="3010161" cy="1272650"/>
+          </a:xfrm>
+          <a:prstGeom prst="rect">
+            <a:avLst/>
+          </a:prstGeom>
+        </p:spPr>
+      </p:pic>
     </p:spTree>
     <p:extLst>
       <p:ext uri="{BB962C8B-B14F-4D97-AF65-F5344CB8AC3E}">
-        <p14:creationId xmlns:p14="http://schemas.microsoft.com/office/powerpoint/2010/main" val="4090539189"/>
+        <p14:creationId xmlns:p14="http://schemas.microsoft.com/office/powerpoint/2010/main" val="2410918077"/>
       </p:ext>
     </p:extLst>
   </p:cSld>
@@ -8637,7 +7707,7 @@
           <p:cNvPr id="2" name="Title 1">
             <a:extLst>
               <a:ext uri="{FF2B5EF4-FFF2-40B4-BE49-F238E27FC236}">
-                <a16:creationId xmlns:a16="http://schemas.microsoft.com/office/drawing/2014/main" id="{2E474F94-4E61-17E6-1DC9-6753BCDB87E6}"/>
+                <a16:creationId xmlns:a16="http://schemas.microsoft.com/office/drawing/2014/main" id="{BD76F5DC-947E-7F44-F695-683988A91641}"/>
               </a:ext>
             </a:extLst>
           </p:cNvPr>
@@ -8645,45 +7715,347 @@
             <a:spLocks noGrp="1"/>
           </p:cNvSpPr>
           <p:nvPr>
-            <p:ph type="ctrTitle"/>
+            <p:ph type="title"/>
           </p:nvPr>
         </p:nvSpPr>
         <p:spPr>
           <a:xfrm>
-            <a:off x="3204642" y="2353641"/>
-            <a:ext cx="5782716" cy="2150719"/>
-          </a:xfrm>
-          <a:noFill/>
-        </p:spPr>
-        <p:txBody>
-          <a:bodyPr anchor="ctr">
+            <a:off x="765752" y="93278"/>
+            <a:ext cx="10515600" cy="661570"/>
+          </a:xfrm>
+        </p:spPr>
+        <p:txBody>
+          <a:bodyPr>
             <a:normAutofit/>
           </a:bodyPr>
           <a:lstStyle/>
           <a:p>
             <a:r>
-              <a:rPr lang="en-US" sz="5400" b="1" dirty="0">
-                <a:solidFill>
-                  <a:srgbClr val="080808"/>
-                </a:solidFill>
-                <a:latin typeface="Calibri" panose="020F0502020204030204" pitchFamily="34" charset="0"/>
-                <a:cs typeface="Calibri" panose="020F0502020204030204" pitchFamily="34" charset="0"/>
+              <a:rPr lang="en-IN" sz="3200" b="1" dirty="0" err="1">
+                <a:latin typeface="+mn-lt"/>
               </a:rPr>
-              <a:t>THANK YOU</a:t>
-            </a:r>
-            <a:endParaRPr lang="hi-IN" sz="5400" b="1" dirty="0">
-              <a:solidFill>
-                <a:srgbClr val="080808"/>
-              </a:solidFill>
-              <a:latin typeface="Calibri" panose="020F0502020204030204" pitchFamily="34" charset="0"/>
-            </a:endParaRPr>
+              <a:t>XGBoost</a:t>
+            </a:r>
+            <a:r>
+              <a:rPr lang="en-IN" sz="3200" b="1" dirty="0">
+                <a:latin typeface="+mn-lt"/>
+              </a:rPr>
+              <a:t> Regressor – Intuition</a:t>
+            </a:r>
+          </a:p>
+        </p:txBody>
+      </p:sp>
+      <p:sp>
+        <p:nvSpPr>
+          <p:cNvPr id="3" name="Content Placeholder 2">
+            <a:extLst>
+              <a:ext uri="{FF2B5EF4-FFF2-40B4-BE49-F238E27FC236}">
+                <a16:creationId xmlns:a16="http://schemas.microsoft.com/office/drawing/2014/main" id="{997CA512-24F3-ECA9-AB32-6426466FA640}"/>
+              </a:ext>
+            </a:extLst>
+          </p:cNvPr>
+          <p:cNvSpPr>
+            <a:spLocks noGrp="1"/>
+          </p:cNvSpPr>
+          <p:nvPr>
+            <p:ph idx="1"/>
+          </p:nvPr>
+        </p:nvSpPr>
+        <p:spPr>
+          <a:xfrm>
+            <a:off x="329514" y="858252"/>
+            <a:ext cx="11681253" cy="5906469"/>
+          </a:xfrm>
+        </p:spPr>
+        <p:txBody>
+          <a:bodyPr>
+            <a:normAutofit/>
+          </a:bodyPr>
+          <a:lstStyle/>
+          <a:p>
+            <a:pPr marL="0" indent="0">
+              <a:buNone/>
+            </a:pPr>
+            <a:r>
+              <a:rPr lang="en-IN" sz="2000" dirty="0" err="1"/>
+              <a:t>XGBoost</a:t>
+            </a:r>
+            <a:r>
+              <a:rPr lang="en-IN" sz="2000" dirty="0"/>
+              <a:t> Regressor is one of the ensemble techniques which is based on the boosting mechanism.</a:t>
+            </a:r>
+          </a:p>
+        </p:txBody>
+      </p:sp>
+      <p:sp>
+        <p:nvSpPr>
+          <p:cNvPr id="5" name="TextBox 4">
+            <a:extLst>
+              <a:ext uri="{FF2B5EF4-FFF2-40B4-BE49-F238E27FC236}">
+                <a16:creationId xmlns:a16="http://schemas.microsoft.com/office/drawing/2014/main" id="{95E3701D-6FF2-6C5E-D17E-5DBBF52D079E}"/>
+              </a:ext>
+            </a:extLst>
+          </p:cNvPr>
+          <p:cNvSpPr txBox="1"/>
+          <p:nvPr/>
+        </p:nvSpPr>
+        <p:spPr>
+          <a:xfrm>
+            <a:off x="6714635" y="3492478"/>
+            <a:ext cx="4774234" cy="369332"/>
+          </a:xfrm>
+          <a:prstGeom prst="rect">
+            <a:avLst/>
+          </a:prstGeom>
+          <a:noFill/>
+        </p:spPr>
+        <p:txBody>
+          <a:bodyPr wrap="square" rtlCol="0">
+            <a:spAutoFit/>
+          </a:bodyPr>
+          <a:lstStyle/>
+          <a:p>
+            <a:pPr algn="ctr"/>
+            <a:r>
+              <a:rPr lang="en-IN" b="1" dirty="0"/>
+              <a:t>Calculating gain using similarity score</a:t>
+            </a:r>
+          </a:p>
+        </p:txBody>
+      </p:sp>
+      <p:pic>
+        <p:nvPicPr>
+          <p:cNvPr id="7" name="Picture 6">
+            <a:extLst>
+              <a:ext uri="{FF2B5EF4-FFF2-40B4-BE49-F238E27FC236}">
+                <a16:creationId xmlns:a16="http://schemas.microsoft.com/office/drawing/2014/main" id="{0B3134F0-93EE-E7F1-0440-EAC1F40D9014}"/>
+              </a:ext>
+            </a:extLst>
+          </p:cNvPr>
+          <p:cNvPicPr>
+            <a:picLocks noChangeAspect="1"/>
+          </p:cNvPicPr>
+          <p:nvPr/>
+        </p:nvPicPr>
+        <p:blipFill>
+          <a:blip r:embed="rId2"/>
+          <a:stretch>
+            <a:fillRect/>
+          </a:stretch>
+        </p:blipFill>
+        <p:spPr>
+          <a:xfrm>
+            <a:off x="572967" y="2217901"/>
+            <a:ext cx="4927959" cy="4397121"/>
+          </a:xfrm>
+          <a:prstGeom prst="rect">
+            <a:avLst/>
+          </a:prstGeom>
+        </p:spPr>
+      </p:pic>
+      <p:pic>
+        <p:nvPicPr>
+          <p:cNvPr id="9" name="Picture 8">
+            <a:extLst>
+              <a:ext uri="{FF2B5EF4-FFF2-40B4-BE49-F238E27FC236}">
+                <a16:creationId xmlns:a16="http://schemas.microsoft.com/office/drawing/2014/main" id="{C30164FD-5106-09B6-4054-44362A155EB2}"/>
+              </a:ext>
+            </a:extLst>
+          </p:cNvPr>
+          <p:cNvPicPr>
+            <a:picLocks noChangeAspect="1"/>
+          </p:cNvPicPr>
+          <p:nvPr/>
+        </p:nvPicPr>
+        <p:blipFill>
+          <a:blip r:embed="rId3"/>
+          <a:stretch>
+            <a:fillRect/>
+          </a:stretch>
+        </p:blipFill>
+        <p:spPr>
+          <a:xfrm>
+            <a:off x="6665604" y="1546467"/>
+            <a:ext cx="4953429" cy="1447925"/>
+          </a:xfrm>
+          <a:prstGeom prst="rect">
+            <a:avLst/>
+          </a:prstGeom>
+        </p:spPr>
+      </p:pic>
+      <p:pic>
+        <p:nvPicPr>
+          <p:cNvPr id="11" name="Picture 10">
+            <a:extLst>
+              <a:ext uri="{FF2B5EF4-FFF2-40B4-BE49-F238E27FC236}">
+                <a16:creationId xmlns:a16="http://schemas.microsoft.com/office/drawing/2014/main" id="{AC775000-845C-4417-F76A-0FA7C0346FFF}"/>
+              </a:ext>
+            </a:extLst>
+          </p:cNvPr>
+          <p:cNvPicPr>
+            <a:picLocks noChangeAspect="1"/>
+          </p:cNvPicPr>
+          <p:nvPr/>
+        </p:nvPicPr>
+        <p:blipFill>
+          <a:blip r:embed="rId4"/>
+          <a:stretch>
+            <a:fillRect/>
+          </a:stretch>
+        </p:blipFill>
+        <p:spPr>
+          <a:xfrm>
+            <a:off x="7490053" y="3970082"/>
+            <a:ext cx="4701947" cy="2598645"/>
+          </a:xfrm>
+          <a:prstGeom prst="rect">
+            <a:avLst/>
+          </a:prstGeom>
+        </p:spPr>
+      </p:pic>
+      <p:sp>
+        <p:nvSpPr>
+          <p:cNvPr id="12" name="TextBox 11">
+            <a:extLst>
+              <a:ext uri="{FF2B5EF4-FFF2-40B4-BE49-F238E27FC236}">
+                <a16:creationId xmlns:a16="http://schemas.microsoft.com/office/drawing/2014/main" id="{B8951F85-DC26-6DBD-EF7D-CFF1001BC6DE}"/>
+              </a:ext>
+            </a:extLst>
+          </p:cNvPr>
+          <p:cNvSpPr txBox="1"/>
+          <p:nvPr/>
+        </p:nvSpPr>
+        <p:spPr>
+          <a:xfrm>
+            <a:off x="1860883" y="1848569"/>
+            <a:ext cx="2382960" cy="400110"/>
+          </a:xfrm>
+          <a:prstGeom prst="rect">
+            <a:avLst/>
+          </a:prstGeom>
+          <a:noFill/>
+        </p:spPr>
+        <p:txBody>
+          <a:bodyPr wrap="none" rtlCol="0">
+            <a:spAutoFit/>
+          </a:bodyPr>
+          <a:lstStyle/>
+          <a:p>
+            <a:r>
+              <a:rPr lang="en-IN" sz="2000" b="1" dirty="0" err="1"/>
+              <a:t>XGBoost</a:t>
+            </a:r>
+            <a:r>
+              <a:rPr lang="en-IN" sz="2000" b="1" dirty="0"/>
+              <a:t> Mechanism</a:t>
+            </a:r>
+          </a:p>
+        </p:txBody>
+      </p:sp>
+      <p:pic>
+        <p:nvPicPr>
+          <p:cNvPr id="17" name="Picture 16">
+            <a:extLst>
+              <a:ext uri="{FF2B5EF4-FFF2-40B4-BE49-F238E27FC236}">
+                <a16:creationId xmlns:a16="http://schemas.microsoft.com/office/drawing/2014/main" id="{DA9D3D87-79B6-C146-AC63-FF8E230DAA59}"/>
+              </a:ext>
+            </a:extLst>
+          </p:cNvPr>
+          <p:cNvPicPr>
+            <a:picLocks noChangeAspect="1"/>
+          </p:cNvPicPr>
+          <p:nvPr/>
+        </p:nvPicPr>
+        <p:blipFill>
+          <a:blip r:embed="rId5"/>
+          <a:stretch>
+            <a:fillRect/>
+          </a:stretch>
+        </p:blipFill>
+        <p:spPr>
+          <a:xfrm>
+            <a:off x="6195876" y="4406582"/>
+            <a:ext cx="990399" cy="1725643"/>
+          </a:xfrm>
+          <a:prstGeom prst="rect">
+            <a:avLst/>
+          </a:prstGeom>
+        </p:spPr>
+      </p:pic>
+      <p:sp>
+        <p:nvSpPr>
+          <p:cNvPr id="18" name="TextBox 17">
+            <a:extLst>
+              <a:ext uri="{FF2B5EF4-FFF2-40B4-BE49-F238E27FC236}">
+                <a16:creationId xmlns:a16="http://schemas.microsoft.com/office/drawing/2014/main" id="{6511EB39-8AFF-901A-39FD-E60246B34A72}"/>
+              </a:ext>
+            </a:extLst>
+          </p:cNvPr>
+          <p:cNvSpPr txBox="1"/>
+          <p:nvPr/>
+        </p:nvSpPr>
+        <p:spPr>
+          <a:xfrm>
+            <a:off x="8793566" y="4761701"/>
+            <a:ext cx="381836" cy="369332"/>
+          </a:xfrm>
+          <a:prstGeom prst="rect">
+            <a:avLst/>
+          </a:prstGeom>
+          <a:noFill/>
+        </p:spPr>
+        <p:txBody>
+          <a:bodyPr wrap="none" rtlCol="0">
+            <a:spAutoFit/>
+          </a:bodyPr>
+          <a:lstStyle/>
+          <a:p>
+            <a:r>
+              <a:rPr lang="en-IN" dirty="0"/>
+              <a:t>M</a:t>
+            </a:r>
+          </a:p>
+        </p:txBody>
+      </p:sp>
+      <p:sp>
+        <p:nvSpPr>
+          <p:cNvPr id="19" name="TextBox 18">
+            <a:extLst>
+              <a:ext uri="{FF2B5EF4-FFF2-40B4-BE49-F238E27FC236}">
+                <a16:creationId xmlns:a16="http://schemas.microsoft.com/office/drawing/2014/main" id="{4F2D7826-202D-E69C-D66E-7C9ABA715F12}"/>
+              </a:ext>
+            </a:extLst>
+          </p:cNvPr>
+          <p:cNvSpPr txBox="1"/>
+          <p:nvPr/>
+        </p:nvSpPr>
+        <p:spPr>
+          <a:xfrm>
+            <a:off x="10026316" y="4761701"/>
+            <a:ext cx="290464" cy="369332"/>
+          </a:xfrm>
+          <a:prstGeom prst="rect">
+            <a:avLst/>
+          </a:prstGeom>
+          <a:noFill/>
+        </p:spPr>
+        <p:txBody>
+          <a:bodyPr wrap="none" rtlCol="0">
+            <a:spAutoFit/>
+          </a:bodyPr>
+          <a:lstStyle/>
+          <a:p>
+            <a:r>
+              <a:rPr lang="en-IN" dirty="0"/>
+              <a:t>F</a:t>
+            </a:r>
           </a:p>
         </p:txBody>
       </p:sp>
     </p:spTree>
     <p:extLst>
       <p:ext uri="{BB962C8B-B14F-4D97-AF65-F5344CB8AC3E}">
-        <p14:creationId xmlns:p14="http://schemas.microsoft.com/office/powerpoint/2010/main" val="730172255"/>
+        <p14:creationId xmlns:p14="http://schemas.microsoft.com/office/powerpoint/2010/main" val="969963409"/>
       </p:ext>
     </p:extLst>
   </p:cSld>
@@ -9799,6 +9171,1534 @@
 </p:sld>
 </file>
 
+<file path=ppt/slides/slide20.xml><?xml version="1.0" encoding="utf-8"?>
+<p:sld xmlns:a="http://schemas.openxmlformats.org/drawingml/2006/main" xmlns:r="http://schemas.openxmlformats.org/officeDocument/2006/relationships" xmlns:p="http://schemas.openxmlformats.org/presentationml/2006/main">
+  <p:cSld>
+    <p:spTree>
+      <p:nvGrpSpPr>
+        <p:cNvPr id="1" name=""/>
+        <p:cNvGrpSpPr/>
+        <p:nvPr/>
+      </p:nvGrpSpPr>
+      <p:grpSpPr>
+        <a:xfrm>
+          <a:off x="0" y="0"/>
+          <a:ext cx="0" cy="0"/>
+          <a:chOff x="0" y="0"/>
+          <a:chExt cx="0" cy="0"/>
+        </a:xfrm>
+      </p:grpSpPr>
+      <p:sp>
+        <p:nvSpPr>
+          <p:cNvPr id="2" name="Title 1">
+            <a:extLst>
+              <a:ext uri="{FF2B5EF4-FFF2-40B4-BE49-F238E27FC236}">
+                <a16:creationId xmlns:a16="http://schemas.microsoft.com/office/drawing/2014/main" id="{456FBD11-8B7B-7BF2-9D53-585FE75D1D31}"/>
+              </a:ext>
+            </a:extLst>
+          </p:cNvPr>
+          <p:cNvSpPr>
+            <a:spLocks noGrp="1"/>
+          </p:cNvSpPr>
+          <p:nvPr>
+            <p:ph type="title"/>
+          </p:nvPr>
+        </p:nvSpPr>
+        <p:spPr>
+          <a:xfrm>
+            <a:off x="838200" y="42434"/>
+            <a:ext cx="10515600" cy="629486"/>
+          </a:xfrm>
+        </p:spPr>
+        <p:txBody>
+          <a:bodyPr>
+            <a:noAutofit/>
+          </a:bodyPr>
+          <a:lstStyle/>
+          <a:p>
+            <a:r>
+              <a:rPr lang="en-IN" sz="3200" b="1" dirty="0" err="1">
+                <a:latin typeface="+mn-lt"/>
+              </a:rPr>
+              <a:t>XGBoost</a:t>
+            </a:r>
+            <a:r>
+              <a:rPr lang="en-IN" sz="3200" b="1" dirty="0">
+                <a:latin typeface="+mn-lt"/>
+              </a:rPr>
+              <a:t> Regressor with Hyperparameter Tuning</a:t>
+            </a:r>
+          </a:p>
+        </p:txBody>
+      </p:sp>
+      <p:sp>
+        <p:nvSpPr>
+          <p:cNvPr id="3" name="Content Placeholder 2">
+            <a:extLst>
+              <a:ext uri="{FF2B5EF4-FFF2-40B4-BE49-F238E27FC236}">
+                <a16:creationId xmlns:a16="http://schemas.microsoft.com/office/drawing/2014/main" id="{7628083F-234A-A296-2D98-6D90F9E543AA}"/>
+              </a:ext>
+            </a:extLst>
+          </p:cNvPr>
+          <p:cNvSpPr>
+            <a:spLocks noGrp="1"/>
+          </p:cNvSpPr>
+          <p:nvPr>
+            <p:ph idx="1"/>
+          </p:nvPr>
+        </p:nvSpPr>
+        <p:spPr>
+          <a:xfrm>
+            <a:off x="838200" y="818146"/>
+            <a:ext cx="10864516" cy="5997420"/>
+          </a:xfrm>
+        </p:spPr>
+        <p:txBody>
+          <a:bodyPr>
+            <a:normAutofit/>
+          </a:bodyPr>
+          <a:lstStyle/>
+          <a:p>
+            <a:endParaRPr lang="en-IN" sz="2000" dirty="0"/>
+          </a:p>
+          <a:p>
+            <a:endParaRPr lang="en-IN" sz="2000" dirty="0"/>
+          </a:p>
+          <a:p>
+            <a:endParaRPr lang="en-IN" sz="2000" dirty="0"/>
+          </a:p>
+          <a:p>
+            <a:endParaRPr lang="en-IN" sz="2000" dirty="0"/>
+          </a:p>
+          <a:p>
+            <a:endParaRPr lang="en-IN" sz="2000" dirty="0"/>
+          </a:p>
+          <a:p>
+            <a:endParaRPr lang="en-IN" sz="2000" dirty="0"/>
+          </a:p>
+          <a:p>
+            <a:endParaRPr lang="en-IN" sz="2000" dirty="0"/>
+          </a:p>
+          <a:p>
+            <a:endParaRPr lang="en-IN" sz="2000" dirty="0"/>
+          </a:p>
+          <a:p>
+            <a:endParaRPr lang="en-IN" sz="2000" dirty="0"/>
+          </a:p>
+          <a:p>
+            <a:endParaRPr lang="en-IN" sz="2000" dirty="0"/>
+          </a:p>
+          <a:p>
+            <a:pPr marL="0" indent="0">
+              <a:buNone/>
+            </a:pPr>
+            <a:endParaRPr lang="en-IN" sz="2000" dirty="0"/>
+          </a:p>
+          <a:p>
+            <a:pPr marL="0" indent="0">
+              <a:buNone/>
+            </a:pPr>
+            <a:endParaRPr lang="en-IN" sz="2000" dirty="0"/>
+          </a:p>
+          <a:p>
+            <a:pPr marL="0" indent="0">
+              <a:buNone/>
+            </a:pPr>
+            <a:r>
+              <a:rPr lang="en-IN" sz="2000" dirty="0"/>
+              <a:t>Using the hyperparameter tuning method we got the model with </a:t>
+            </a:r>
+            <a:r>
+              <a:rPr lang="en-IN" sz="2000" dirty="0" err="1"/>
+              <a:t>max_depth</a:t>
+            </a:r>
+            <a:r>
+              <a:rPr lang="en-IN" sz="2000" dirty="0"/>
+              <a:t> 4 and </a:t>
+            </a:r>
+            <a:r>
+              <a:rPr lang="en-IN" sz="2000" dirty="0" err="1"/>
+              <a:t>nrounds</a:t>
+            </a:r>
+            <a:r>
+              <a:rPr lang="en-IN" sz="2000" dirty="0"/>
+              <a:t> = 600 is giving the maximum </a:t>
+            </a:r>
+            <a:r>
+              <a:rPr lang="en-IN" sz="2000" dirty="0" err="1"/>
+              <a:t>Rsquared</a:t>
+            </a:r>
+            <a:r>
+              <a:rPr lang="en-IN" sz="2000" dirty="0"/>
+              <a:t> value and Minimum root mean squared error.</a:t>
+            </a:r>
+          </a:p>
+        </p:txBody>
+      </p:sp>
+      <p:pic>
+        <p:nvPicPr>
+          <p:cNvPr id="7" name="Picture 6">
+            <a:extLst>
+              <a:ext uri="{FF2B5EF4-FFF2-40B4-BE49-F238E27FC236}">
+                <a16:creationId xmlns:a16="http://schemas.microsoft.com/office/drawing/2014/main" id="{53C517CC-D1E9-42A4-CFFA-D5CF395E90E2}"/>
+              </a:ext>
+            </a:extLst>
+          </p:cNvPr>
+          <p:cNvPicPr>
+            <a:picLocks noChangeAspect="1"/>
+          </p:cNvPicPr>
+          <p:nvPr/>
+        </p:nvPicPr>
+        <p:blipFill>
+          <a:blip r:embed="rId2"/>
+          <a:stretch>
+            <a:fillRect/>
+          </a:stretch>
+        </p:blipFill>
+        <p:spPr>
+          <a:xfrm>
+            <a:off x="1402358" y="1998019"/>
+            <a:ext cx="2911092" cy="556308"/>
+          </a:xfrm>
+          <a:prstGeom prst="rect">
+            <a:avLst/>
+          </a:prstGeom>
+        </p:spPr>
+      </p:pic>
+      <p:pic>
+        <p:nvPicPr>
+          <p:cNvPr id="9" name="Picture 8">
+            <a:extLst>
+              <a:ext uri="{FF2B5EF4-FFF2-40B4-BE49-F238E27FC236}">
+                <a16:creationId xmlns:a16="http://schemas.microsoft.com/office/drawing/2014/main" id="{57601FF2-AEF6-AF2C-2022-DE49B1A0D6A2}"/>
+              </a:ext>
+            </a:extLst>
+          </p:cNvPr>
+          <p:cNvPicPr>
+            <a:picLocks noChangeAspect="1"/>
+          </p:cNvPicPr>
+          <p:nvPr/>
+        </p:nvPicPr>
+        <p:blipFill>
+          <a:blip r:embed="rId3"/>
+          <a:stretch>
+            <a:fillRect/>
+          </a:stretch>
+        </p:blipFill>
+        <p:spPr>
+          <a:xfrm>
+            <a:off x="2039341" y="3651453"/>
+            <a:ext cx="7521592" cy="1714649"/>
+          </a:xfrm>
+          <a:prstGeom prst="rect">
+            <a:avLst/>
+          </a:prstGeom>
+        </p:spPr>
+      </p:pic>
+      <p:pic>
+        <p:nvPicPr>
+          <p:cNvPr id="8" name="Picture 7">
+            <a:extLst>
+              <a:ext uri="{FF2B5EF4-FFF2-40B4-BE49-F238E27FC236}">
+                <a16:creationId xmlns:a16="http://schemas.microsoft.com/office/drawing/2014/main" id="{6B9AFACA-75A1-4F9E-2E89-335DB555DB8B}"/>
+              </a:ext>
+            </a:extLst>
+          </p:cNvPr>
+          <p:cNvPicPr>
+            <a:picLocks noChangeAspect="1"/>
+          </p:cNvPicPr>
+          <p:nvPr/>
+        </p:nvPicPr>
+        <p:blipFill>
+          <a:blip r:embed="rId4"/>
+          <a:stretch>
+            <a:fillRect/>
+          </a:stretch>
+        </p:blipFill>
+        <p:spPr>
+          <a:xfrm>
+            <a:off x="6905575" y="1704806"/>
+            <a:ext cx="3596952" cy="1089754"/>
+          </a:xfrm>
+          <a:prstGeom prst="rect">
+            <a:avLst/>
+          </a:prstGeom>
+        </p:spPr>
+      </p:pic>
+      <p:sp>
+        <p:nvSpPr>
+          <p:cNvPr id="10" name="TextBox 9">
+            <a:extLst>
+              <a:ext uri="{FF2B5EF4-FFF2-40B4-BE49-F238E27FC236}">
+                <a16:creationId xmlns:a16="http://schemas.microsoft.com/office/drawing/2014/main" id="{8C273F12-6DD8-2CCB-AC44-9B435C4C6723}"/>
+              </a:ext>
+            </a:extLst>
+          </p:cNvPr>
+          <p:cNvSpPr txBox="1"/>
+          <p:nvPr/>
+        </p:nvSpPr>
+        <p:spPr>
+          <a:xfrm>
+            <a:off x="2393221" y="3154770"/>
+            <a:ext cx="7042121" cy="400110"/>
+          </a:xfrm>
+          <a:prstGeom prst="rect">
+            <a:avLst/>
+          </a:prstGeom>
+          <a:noFill/>
+        </p:spPr>
+        <p:txBody>
+          <a:bodyPr wrap="none" rtlCol="0">
+            <a:spAutoFit/>
+          </a:bodyPr>
+          <a:lstStyle/>
+          <a:p>
+            <a:r>
+              <a:rPr lang="en-IN" sz="2000" dirty="0"/>
+              <a:t>An iterative algorithm to find the best value of depth and </a:t>
+            </a:r>
+            <a:r>
+              <a:rPr lang="en-IN" sz="2000" dirty="0" err="1"/>
+              <a:t>nrounds</a:t>
+            </a:r>
+            <a:endParaRPr lang="en-IN" sz="2000" dirty="0"/>
+          </a:p>
+        </p:txBody>
+      </p:sp>
+      <p:sp>
+        <p:nvSpPr>
+          <p:cNvPr id="11" name="TextBox 10">
+            <a:extLst>
+              <a:ext uri="{FF2B5EF4-FFF2-40B4-BE49-F238E27FC236}">
+                <a16:creationId xmlns:a16="http://schemas.microsoft.com/office/drawing/2014/main" id="{0545175F-B0D1-B4B0-AC42-B3083295CBD8}"/>
+              </a:ext>
+            </a:extLst>
+          </p:cNvPr>
+          <p:cNvSpPr txBox="1"/>
+          <p:nvPr/>
+        </p:nvSpPr>
+        <p:spPr>
+          <a:xfrm>
+            <a:off x="6217236" y="1152969"/>
+            <a:ext cx="5159426" cy="400110"/>
+          </a:xfrm>
+          <a:prstGeom prst="rect">
+            <a:avLst/>
+          </a:prstGeom>
+          <a:noFill/>
+        </p:spPr>
+        <p:txBody>
+          <a:bodyPr wrap="none" rtlCol="0">
+            <a:spAutoFit/>
+          </a:bodyPr>
+          <a:lstStyle/>
+          <a:p>
+            <a:r>
+              <a:rPr lang="en-IN" sz="2000" dirty="0"/>
+              <a:t>Matrix Transformation for training and test data</a:t>
+            </a:r>
+          </a:p>
+        </p:txBody>
+      </p:sp>
+      <p:sp>
+        <p:nvSpPr>
+          <p:cNvPr id="12" name="TextBox 11">
+            <a:extLst>
+              <a:ext uri="{FF2B5EF4-FFF2-40B4-BE49-F238E27FC236}">
+                <a16:creationId xmlns:a16="http://schemas.microsoft.com/office/drawing/2014/main" id="{495B9253-AEC1-0FFE-8581-C639B3D43440}"/>
+              </a:ext>
+            </a:extLst>
+          </p:cNvPr>
+          <p:cNvSpPr txBox="1"/>
+          <p:nvPr/>
+        </p:nvSpPr>
+        <p:spPr>
+          <a:xfrm>
+            <a:off x="628063" y="1160101"/>
+            <a:ext cx="4459682" cy="400110"/>
+          </a:xfrm>
+          <a:prstGeom prst="rect">
+            <a:avLst/>
+          </a:prstGeom>
+          <a:noFill/>
+        </p:spPr>
+        <p:txBody>
+          <a:bodyPr wrap="none" rtlCol="0">
+            <a:spAutoFit/>
+          </a:bodyPr>
+          <a:lstStyle/>
+          <a:p>
+            <a:r>
+              <a:rPr lang="en-IN" sz="2000" dirty="0"/>
+              <a:t>Passing range for hyperparameter Tuning</a:t>
+            </a:r>
+          </a:p>
+        </p:txBody>
+      </p:sp>
+      <p:cxnSp>
+        <p:nvCxnSpPr>
+          <p:cNvPr id="16" name="Straight Connector 15">
+            <a:extLst>
+              <a:ext uri="{FF2B5EF4-FFF2-40B4-BE49-F238E27FC236}">
+                <a16:creationId xmlns:a16="http://schemas.microsoft.com/office/drawing/2014/main" id="{5E6BDFD8-228E-C013-F161-BF847A507EB9}"/>
+              </a:ext>
+            </a:extLst>
+          </p:cNvPr>
+          <p:cNvCxnSpPr/>
+          <p:nvPr/>
+        </p:nvCxnSpPr>
+        <p:spPr>
+          <a:xfrm flipH="1">
+            <a:off x="1074821" y="3050751"/>
+            <a:ext cx="4369071" cy="0"/>
+          </a:xfrm>
+          <a:prstGeom prst="line">
+            <a:avLst/>
+          </a:prstGeom>
+        </p:spPr>
+        <p:style>
+          <a:lnRef idx="1">
+            <a:schemeClr val="accent1"/>
+          </a:lnRef>
+          <a:fillRef idx="0">
+            <a:schemeClr val="accent1"/>
+          </a:fillRef>
+          <a:effectRef idx="0">
+            <a:schemeClr val="accent1"/>
+          </a:effectRef>
+          <a:fontRef idx="minor">
+            <a:schemeClr val="tx1"/>
+          </a:fontRef>
+        </p:style>
+      </p:cxnSp>
+      <p:cxnSp>
+        <p:nvCxnSpPr>
+          <p:cNvPr id="18" name="Straight Connector 17">
+            <a:extLst>
+              <a:ext uri="{FF2B5EF4-FFF2-40B4-BE49-F238E27FC236}">
+                <a16:creationId xmlns:a16="http://schemas.microsoft.com/office/drawing/2014/main" id="{4E5DEB92-4259-F698-3F46-1D775B7F7322}"/>
+              </a:ext>
+            </a:extLst>
+          </p:cNvPr>
+          <p:cNvCxnSpPr/>
+          <p:nvPr/>
+        </p:nvCxnSpPr>
+        <p:spPr>
+          <a:xfrm>
+            <a:off x="5443892" y="3050751"/>
+            <a:ext cx="4897817" cy="0"/>
+          </a:xfrm>
+          <a:prstGeom prst="line">
+            <a:avLst/>
+          </a:prstGeom>
+        </p:spPr>
+        <p:style>
+          <a:lnRef idx="1">
+            <a:schemeClr val="accent1"/>
+          </a:lnRef>
+          <a:fillRef idx="0">
+            <a:schemeClr val="accent1"/>
+          </a:fillRef>
+          <a:effectRef idx="0">
+            <a:schemeClr val="accent1"/>
+          </a:effectRef>
+          <a:fontRef idx="minor">
+            <a:schemeClr val="tx1"/>
+          </a:fontRef>
+        </p:style>
+      </p:cxnSp>
+    </p:spTree>
+    <p:extLst>
+      <p:ext uri="{BB962C8B-B14F-4D97-AF65-F5344CB8AC3E}">
+        <p14:creationId xmlns:p14="http://schemas.microsoft.com/office/powerpoint/2010/main" val="581151939"/>
+      </p:ext>
+    </p:extLst>
+  </p:cSld>
+  <p:clrMapOvr>
+    <a:masterClrMapping/>
+  </p:clrMapOvr>
+</p:sld>
+</file>
+
+<file path=ppt/slides/slide21.xml><?xml version="1.0" encoding="utf-8"?>
+<p:sld xmlns:a="http://schemas.openxmlformats.org/drawingml/2006/main" xmlns:r="http://schemas.openxmlformats.org/officeDocument/2006/relationships" xmlns:p="http://schemas.openxmlformats.org/presentationml/2006/main">
+  <p:cSld>
+    <p:spTree>
+      <p:nvGrpSpPr>
+        <p:cNvPr id="1" name=""/>
+        <p:cNvGrpSpPr/>
+        <p:nvPr/>
+      </p:nvGrpSpPr>
+      <p:grpSpPr>
+        <a:xfrm>
+          <a:off x="0" y="0"/>
+          <a:ext cx="0" cy="0"/>
+          <a:chOff x="0" y="0"/>
+          <a:chExt cx="0" cy="0"/>
+        </a:xfrm>
+      </p:grpSpPr>
+      <p:sp>
+        <p:nvSpPr>
+          <p:cNvPr id="2" name="Title 1">
+            <a:extLst>
+              <a:ext uri="{FF2B5EF4-FFF2-40B4-BE49-F238E27FC236}">
+                <a16:creationId xmlns:a16="http://schemas.microsoft.com/office/drawing/2014/main" id="{265F92F4-49B1-0900-C83A-8CE9FE53DAE2}"/>
+              </a:ext>
+            </a:extLst>
+          </p:cNvPr>
+          <p:cNvSpPr>
+            <a:spLocks noGrp="1"/>
+          </p:cNvSpPr>
+          <p:nvPr>
+            <p:ph type="title"/>
+          </p:nvPr>
+        </p:nvSpPr>
+        <p:spPr>
+          <a:xfrm>
+            <a:off x="838200" y="0"/>
+            <a:ext cx="10515600" cy="597400"/>
+          </a:xfrm>
+        </p:spPr>
+        <p:txBody>
+          <a:bodyPr>
+            <a:normAutofit/>
+          </a:bodyPr>
+          <a:lstStyle/>
+          <a:p>
+            <a:r>
+              <a:rPr lang="en-IN" sz="3200" b="1" dirty="0" err="1">
+                <a:latin typeface="+mn-lt"/>
+              </a:rPr>
+              <a:t>XGBoost</a:t>
+            </a:r>
+            <a:r>
+              <a:rPr lang="en-IN" sz="3200" b="1" dirty="0">
+                <a:latin typeface="+mn-lt"/>
+              </a:rPr>
+              <a:t> – Best model selection with Hyperparameter Tuning</a:t>
+            </a:r>
+          </a:p>
+        </p:txBody>
+      </p:sp>
+      <p:sp>
+        <p:nvSpPr>
+          <p:cNvPr id="3" name="Content Placeholder 2">
+            <a:extLst>
+              <a:ext uri="{FF2B5EF4-FFF2-40B4-BE49-F238E27FC236}">
+                <a16:creationId xmlns:a16="http://schemas.microsoft.com/office/drawing/2014/main" id="{BB0956A1-B24B-0AB8-DE75-336352031BFB}"/>
+              </a:ext>
+            </a:extLst>
+          </p:cNvPr>
+          <p:cNvSpPr>
+            <a:spLocks noGrp="1"/>
+          </p:cNvSpPr>
+          <p:nvPr>
+            <p:ph idx="1"/>
+          </p:nvPr>
+        </p:nvSpPr>
+        <p:spPr>
+          <a:xfrm>
+            <a:off x="838200" y="1219200"/>
+            <a:ext cx="10515600" cy="4957763"/>
+          </a:xfrm>
+        </p:spPr>
+        <p:txBody>
+          <a:bodyPr/>
+          <a:lstStyle/>
+          <a:p>
+            <a:pPr marL="0" indent="0">
+              <a:buNone/>
+            </a:pPr>
+            <a:endParaRPr lang="en-IN" dirty="0"/>
+          </a:p>
+          <a:p>
+            <a:endParaRPr lang="en-IN" dirty="0"/>
+          </a:p>
+          <a:p>
+            <a:endParaRPr lang="en-IN" dirty="0"/>
+          </a:p>
+          <a:p>
+            <a:endParaRPr lang="en-IN" dirty="0"/>
+          </a:p>
+        </p:txBody>
+      </p:sp>
+      <p:pic>
+        <p:nvPicPr>
+          <p:cNvPr id="7" name="Picture 6">
+            <a:extLst>
+              <a:ext uri="{FF2B5EF4-FFF2-40B4-BE49-F238E27FC236}">
+                <a16:creationId xmlns:a16="http://schemas.microsoft.com/office/drawing/2014/main" id="{5062A7CB-300C-1E4D-C106-6669C58871E6}"/>
+              </a:ext>
+            </a:extLst>
+          </p:cNvPr>
+          <p:cNvPicPr>
+            <a:picLocks noChangeAspect="1"/>
+          </p:cNvPicPr>
+          <p:nvPr/>
+        </p:nvPicPr>
+        <p:blipFill>
+          <a:blip r:embed="rId2"/>
+          <a:stretch>
+            <a:fillRect/>
+          </a:stretch>
+        </p:blipFill>
+        <p:spPr>
+          <a:xfrm>
+            <a:off x="3363266" y="5871229"/>
+            <a:ext cx="4293418" cy="969576"/>
+          </a:xfrm>
+          <a:prstGeom prst="rect">
+            <a:avLst/>
+          </a:prstGeom>
+        </p:spPr>
+      </p:pic>
+      <p:pic>
+        <p:nvPicPr>
+          <p:cNvPr id="9" name="Picture 8">
+            <a:extLst>
+              <a:ext uri="{FF2B5EF4-FFF2-40B4-BE49-F238E27FC236}">
+                <a16:creationId xmlns:a16="http://schemas.microsoft.com/office/drawing/2014/main" id="{CA1EC61F-9AF8-4799-81C7-FEE51BD75934}"/>
+              </a:ext>
+            </a:extLst>
+          </p:cNvPr>
+          <p:cNvPicPr>
+            <a:picLocks noChangeAspect="1"/>
+          </p:cNvPicPr>
+          <p:nvPr/>
+        </p:nvPicPr>
+        <p:blipFill>
+          <a:blip r:embed="rId3"/>
+          <a:stretch>
+            <a:fillRect/>
+          </a:stretch>
+        </p:blipFill>
+        <p:spPr>
+          <a:xfrm>
+            <a:off x="685388" y="864450"/>
+            <a:ext cx="4012229" cy="2364748"/>
+          </a:xfrm>
+          <a:prstGeom prst="rect">
+            <a:avLst/>
+          </a:prstGeom>
+        </p:spPr>
+      </p:pic>
+      <p:pic>
+        <p:nvPicPr>
+          <p:cNvPr id="11" name="Picture 10">
+            <a:extLst>
+              <a:ext uri="{FF2B5EF4-FFF2-40B4-BE49-F238E27FC236}">
+                <a16:creationId xmlns:a16="http://schemas.microsoft.com/office/drawing/2014/main" id="{9EFFC309-6A8B-4F05-1D63-349E71E98E77}"/>
+              </a:ext>
+            </a:extLst>
+          </p:cNvPr>
+          <p:cNvPicPr>
+            <a:picLocks noChangeAspect="1"/>
+          </p:cNvPicPr>
+          <p:nvPr/>
+        </p:nvPicPr>
+        <p:blipFill>
+          <a:blip r:embed="rId4"/>
+          <a:stretch>
+            <a:fillRect/>
+          </a:stretch>
+        </p:blipFill>
+        <p:spPr>
+          <a:xfrm>
+            <a:off x="685388" y="3330930"/>
+            <a:ext cx="4293418" cy="2498096"/>
+          </a:xfrm>
+          <a:prstGeom prst="rect">
+            <a:avLst/>
+          </a:prstGeom>
+        </p:spPr>
+      </p:pic>
+      <p:pic>
+        <p:nvPicPr>
+          <p:cNvPr id="17" name="Picture 16">
+            <a:extLst>
+              <a:ext uri="{FF2B5EF4-FFF2-40B4-BE49-F238E27FC236}">
+                <a16:creationId xmlns:a16="http://schemas.microsoft.com/office/drawing/2014/main" id="{BBBC5877-51B1-1F9D-81CB-C5DC03F569C7}"/>
+              </a:ext>
+            </a:extLst>
+          </p:cNvPr>
+          <p:cNvPicPr>
+            <a:picLocks noChangeAspect="1"/>
+          </p:cNvPicPr>
+          <p:nvPr/>
+        </p:nvPicPr>
+        <p:blipFill>
+          <a:blip r:embed="rId5"/>
+          <a:stretch>
+            <a:fillRect/>
+          </a:stretch>
+        </p:blipFill>
+        <p:spPr>
+          <a:xfrm>
+            <a:off x="6103007" y="864450"/>
+            <a:ext cx="4078743" cy="2466480"/>
+          </a:xfrm>
+          <a:prstGeom prst="rect">
+            <a:avLst/>
+          </a:prstGeom>
+        </p:spPr>
+      </p:pic>
+      <p:pic>
+        <p:nvPicPr>
+          <p:cNvPr id="19" name="Picture 18">
+            <a:extLst>
+              <a:ext uri="{FF2B5EF4-FFF2-40B4-BE49-F238E27FC236}">
+                <a16:creationId xmlns:a16="http://schemas.microsoft.com/office/drawing/2014/main" id="{F56AAC6C-2BDB-A283-BC92-B37C41CEFA1F}"/>
+              </a:ext>
+            </a:extLst>
+          </p:cNvPr>
+          <p:cNvPicPr>
+            <a:picLocks noChangeAspect="1"/>
+          </p:cNvPicPr>
+          <p:nvPr/>
+        </p:nvPicPr>
+        <p:blipFill>
+          <a:blip r:embed="rId6"/>
+          <a:stretch>
+            <a:fillRect/>
+          </a:stretch>
+        </p:blipFill>
+        <p:spPr>
+          <a:xfrm>
+            <a:off x="6096000" y="3246560"/>
+            <a:ext cx="4402856" cy="2646493"/>
+          </a:xfrm>
+          <a:prstGeom prst="rect">
+            <a:avLst/>
+          </a:prstGeom>
+        </p:spPr>
+      </p:pic>
+      <p:cxnSp>
+        <p:nvCxnSpPr>
+          <p:cNvPr id="5" name="Straight Connector 4">
+            <a:extLst>
+              <a:ext uri="{FF2B5EF4-FFF2-40B4-BE49-F238E27FC236}">
+                <a16:creationId xmlns:a16="http://schemas.microsoft.com/office/drawing/2014/main" id="{EF2AB39F-F758-726B-4F20-359A8313E675}"/>
+              </a:ext>
+            </a:extLst>
+          </p:cNvPr>
+          <p:cNvCxnSpPr/>
+          <p:nvPr/>
+        </p:nvCxnSpPr>
+        <p:spPr>
+          <a:xfrm>
+            <a:off x="5509975" y="555358"/>
+            <a:ext cx="0" cy="5083442"/>
+          </a:xfrm>
+          <a:prstGeom prst="line">
+            <a:avLst/>
+          </a:prstGeom>
+        </p:spPr>
+        <p:style>
+          <a:lnRef idx="1">
+            <a:schemeClr val="accent1"/>
+          </a:lnRef>
+          <a:fillRef idx="0">
+            <a:schemeClr val="accent1"/>
+          </a:fillRef>
+          <a:effectRef idx="0">
+            <a:schemeClr val="accent1"/>
+          </a:effectRef>
+          <a:fontRef idx="minor">
+            <a:schemeClr val="tx1"/>
+          </a:fontRef>
+        </p:style>
+      </p:cxnSp>
+    </p:spTree>
+    <p:extLst>
+      <p:ext uri="{BB962C8B-B14F-4D97-AF65-F5344CB8AC3E}">
+        <p14:creationId xmlns:p14="http://schemas.microsoft.com/office/powerpoint/2010/main" val="841477307"/>
+      </p:ext>
+    </p:extLst>
+  </p:cSld>
+  <p:clrMapOvr>
+    <a:masterClrMapping/>
+  </p:clrMapOvr>
+</p:sld>
+</file>
+
+<file path=ppt/slides/slide22.xml><?xml version="1.0" encoding="utf-8"?>
+<p:sld xmlns:a="http://schemas.openxmlformats.org/drawingml/2006/main" xmlns:r="http://schemas.openxmlformats.org/officeDocument/2006/relationships" xmlns:p="http://schemas.openxmlformats.org/presentationml/2006/main">
+  <p:cSld>
+    <p:spTree>
+      <p:nvGrpSpPr>
+        <p:cNvPr id="1" name=""/>
+        <p:cNvGrpSpPr/>
+        <p:nvPr/>
+      </p:nvGrpSpPr>
+      <p:grpSpPr>
+        <a:xfrm>
+          <a:off x="0" y="0"/>
+          <a:ext cx="0" cy="0"/>
+          <a:chOff x="0" y="0"/>
+          <a:chExt cx="0" cy="0"/>
+        </a:xfrm>
+      </p:grpSpPr>
+      <p:sp>
+        <p:nvSpPr>
+          <p:cNvPr id="2" name="Title 1">
+            <a:extLst>
+              <a:ext uri="{FF2B5EF4-FFF2-40B4-BE49-F238E27FC236}">
+                <a16:creationId xmlns:a16="http://schemas.microsoft.com/office/drawing/2014/main" id="{F453E7CA-6BA4-AE64-5325-47E0EB9A20BA}"/>
+              </a:ext>
+            </a:extLst>
+          </p:cNvPr>
+          <p:cNvSpPr>
+            <a:spLocks noGrp="1"/>
+          </p:cNvSpPr>
+          <p:nvPr>
+            <p:ph type="title"/>
+          </p:nvPr>
+        </p:nvSpPr>
+        <p:spPr>
+          <a:xfrm>
+            <a:off x="838200" y="365126"/>
+            <a:ext cx="10515600" cy="773864"/>
+          </a:xfrm>
+        </p:spPr>
+        <p:txBody>
+          <a:bodyPr>
+            <a:normAutofit/>
+          </a:bodyPr>
+          <a:lstStyle/>
+          <a:p>
+            <a:r>
+              <a:rPr lang="en-IN" sz="3200" b="1" dirty="0">
+                <a:latin typeface="+mn-lt"/>
+              </a:rPr>
+              <a:t>Summary of Model Results:</a:t>
+            </a:r>
+          </a:p>
+        </p:txBody>
+      </p:sp>
+      <p:graphicFrame>
+        <p:nvGraphicFramePr>
+          <p:cNvPr id="4" name="Table 4">
+            <a:extLst>
+              <a:ext uri="{FF2B5EF4-FFF2-40B4-BE49-F238E27FC236}">
+                <a16:creationId xmlns:a16="http://schemas.microsoft.com/office/drawing/2014/main" id="{7677C3FE-5721-DA8C-3228-0FA0606EA12A}"/>
+              </a:ext>
+            </a:extLst>
+          </p:cNvPr>
+          <p:cNvGraphicFramePr>
+            <a:graphicFrameLocks noGrp="1"/>
+          </p:cNvGraphicFramePr>
+          <p:nvPr>
+            <p:ph idx="1"/>
+          </p:nvPr>
+        </p:nvGraphicFramePr>
+        <p:xfrm>
+          <a:off x="838200" y="1491916"/>
+          <a:ext cx="10515600" cy="3577387"/>
+        </p:xfrm>
+        <a:graphic>
+          <a:graphicData uri="http://schemas.openxmlformats.org/drawingml/2006/table">
+            <a:tbl>
+              <a:tblPr firstRow="1" bandRow="1">
+                <a:tableStyleId>{5C22544A-7EE6-4342-B048-85BDC9FD1C3A}</a:tableStyleId>
+              </a:tblPr>
+              <a:tblGrid>
+                <a:gridCol w="2103120">
+                  <a:extLst>
+                    <a:ext uri="{9D8B030D-6E8A-4147-A177-3AD203B41FA5}">
+                      <a16:colId xmlns:a16="http://schemas.microsoft.com/office/drawing/2014/main" val="2802901101"/>
+                    </a:ext>
+                  </a:extLst>
+                </a:gridCol>
+                <a:gridCol w="2103120">
+                  <a:extLst>
+                    <a:ext uri="{9D8B030D-6E8A-4147-A177-3AD203B41FA5}">
+                      <a16:colId xmlns:a16="http://schemas.microsoft.com/office/drawing/2014/main" val="351254930"/>
+                    </a:ext>
+                  </a:extLst>
+                </a:gridCol>
+                <a:gridCol w="2103120">
+                  <a:extLst>
+                    <a:ext uri="{9D8B030D-6E8A-4147-A177-3AD203B41FA5}">
+                      <a16:colId xmlns:a16="http://schemas.microsoft.com/office/drawing/2014/main" val="3437466710"/>
+                    </a:ext>
+                  </a:extLst>
+                </a:gridCol>
+                <a:gridCol w="2103120">
+                  <a:extLst>
+                    <a:ext uri="{9D8B030D-6E8A-4147-A177-3AD203B41FA5}">
+                      <a16:colId xmlns:a16="http://schemas.microsoft.com/office/drawing/2014/main" val="2993918040"/>
+                    </a:ext>
+                  </a:extLst>
+                </a:gridCol>
+                <a:gridCol w="2103120">
+                  <a:extLst>
+                    <a:ext uri="{9D8B030D-6E8A-4147-A177-3AD203B41FA5}">
+                      <a16:colId xmlns:a16="http://schemas.microsoft.com/office/drawing/2014/main" val="1594398749"/>
+                    </a:ext>
+                  </a:extLst>
+                </a:gridCol>
+              </a:tblGrid>
+              <a:tr h="787928">
+                <a:tc>
+                  <a:txBody>
+                    <a:bodyPr/>
+                    <a:lstStyle/>
+                    <a:p>
+                      <a:r>
+                        <a:rPr lang="en-IN" dirty="0"/>
+                        <a:t>Model(Algorithm)</a:t>
+                      </a:r>
+                    </a:p>
+                  </a:txBody>
+                  <a:tcPr/>
+                </a:tc>
+                <a:tc>
+                  <a:txBody>
+                    <a:bodyPr/>
+                    <a:lstStyle/>
+                    <a:p>
+                      <a:r>
+                        <a:rPr lang="en-IN" dirty="0"/>
+                        <a:t>R-squared(Train)</a:t>
+                      </a:r>
+                    </a:p>
+                  </a:txBody>
+                  <a:tcPr/>
+                </a:tc>
+                <a:tc>
+                  <a:txBody>
+                    <a:bodyPr/>
+                    <a:lstStyle/>
+                    <a:p>
+                      <a:pPr marL="0" marR="0" lvl="0" indent="0" algn="l" defTabSz="914400" rtl="0" eaLnBrk="1" fontAlgn="auto" latinLnBrk="0" hangingPunct="1">
+                        <a:lnSpc>
+                          <a:spcPct val="100000"/>
+                        </a:lnSpc>
+                        <a:spcBef>
+                          <a:spcPts val="0"/>
+                        </a:spcBef>
+                        <a:spcAft>
+                          <a:spcPts val="0"/>
+                        </a:spcAft>
+                        <a:buClrTx/>
+                        <a:buSzTx/>
+                        <a:buFontTx/>
+                        <a:buNone/>
+                        <a:tabLst/>
+                        <a:defRPr/>
+                      </a:pPr>
+                      <a:r>
+                        <a:rPr lang="en-IN" dirty="0"/>
+                        <a:t>R-squared(Test)</a:t>
+                      </a:r>
+                    </a:p>
+                  </a:txBody>
+                  <a:tcPr/>
+                </a:tc>
+                <a:tc>
+                  <a:txBody>
+                    <a:bodyPr/>
+                    <a:lstStyle/>
+                    <a:p>
+                      <a:r>
+                        <a:rPr lang="en-IN" dirty="0"/>
+                        <a:t>RMSE(Train)</a:t>
+                      </a:r>
+                    </a:p>
+                  </a:txBody>
+                  <a:tcPr/>
+                </a:tc>
+                <a:tc>
+                  <a:txBody>
+                    <a:bodyPr/>
+                    <a:lstStyle/>
+                    <a:p>
+                      <a:r>
+                        <a:rPr lang="en-IN" dirty="0"/>
+                        <a:t>RMSE(Test)</a:t>
+                      </a:r>
+                    </a:p>
+                  </a:txBody>
+                  <a:tcPr/>
+                </a:tc>
+                <a:extLst>
+                  <a:ext uri="{0D108BD9-81ED-4DB2-BD59-A6C34878D82A}">
+                    <a16:rowId xmlns:a16="http://schemas.microsoft.com/office/drawing/2014/main" val="2515094857"/>
+                  </a:ext>
+                </a:extLst>
+              </a:tr>
+              <a:tr h="414726">
+                <a:tc>
+                  <a:txBody>
+                    <a:bodyPr/>
+                    <a:lstStyle/>
+                    <a:p>
+                      <a:r>
+                        <a:rPr lang="en-IN" dirty="0"/>
+                        <a:t>Linear Regression</a:t>
+                      </a:r>
+                    </a:p>
+                  </a:txBody>
+                  <a:tcPr/>
+                </a:tc>
+                <a:tc>
+                  <a:txBody>
+                    <a:bodyPr/>
+                    <a:lstStyle/>
+                    <a:p>
+                      <a:r>
+                        <a:rPr lang="en-IN" dirty="0"/>
+                        <a:t>75.58%</a:t>
+                      </a:r>
+                    </a:p>
+                  </a:txBody>
+                  <a:tcPr/>
+                </a:tc>
+                <a:tc>
+                  <a:txBody>
+                    <a:bodyPr/>
+                    <a:lstStyle/>
+                    <a:p>
+                      <a:r>
+                        <a:rPr lang="en-IN" dirty="0"/>
+                        <a:t>74.65%</a:t>
+                      </a:r>
+                    </a:p>
+                  </a:txBody>
+                  <a:tcPr/>
+                </a:tc>
+                <a:tc>
+                  <a:txBody>
+                    <a:bodyPr/>
+                    <a:lstStyle/>
+                    <a:p>
+                      <a:r>
+                        <a:rPr lang="en-IN" dirty="0"/>
+                        <a:t>0.4933</a:t>
+                      </a:r>
+                    </a:p>
+                  </a:txBody>
+                  <a:tcPr/>
+                </a:tc>
+                <a:tc>
+                  <a:txBody>
+                    <a:bodyPr/>
+                    <a:lstStyle/>
+                    <a:p>
+                      <a:r>
+                        <a:rPr lang="en-IN" dirty="0"/>
+                        <a:t>0.5070</a:t>
+                      </a:r>
+                    </a:p>
+                  </a:txBody>
+                  <a:tcPr/>
+                </a:tc>
+                <a:extLst>
+                  <a:ext uri="{0D108BD9-81ED-4DB2-BD59-A6C34878D82A}">
+                    <a16:rowId xmlns:a16="http://schemas.microsoft.com/office/drawing/2014/main" val="3380751878"/>
+                  </a:ext>
+                </a:extLst>
+              </a:tr>
+              <a:tr h="414726">
+                <a:tc>
+                  <a:txBody>
+                    <a:bodyPr/>
+                    <a:lstStyle/>
+                    <a:p>
+                      <a:r>
+                        <a:rPr lang="en-IN" dirty="0"/>
+                        <a:t>Lasso Regression</a:t>
+                      </a:r>
+                    </a:p>
+                  </a:txBody>
+                  <a:tcPr/>
+                </a:tc>
+                <a:tc>
+                  <a:txBody>
+                    <a:bodyPr/>
+                    <a:lstStyle/>
+                    <a:p>
+                      <a:r>
+                        <a:rPr lang="en-IN" dirty="0"/>
+                        <a:t>75.84%</a:t>
+                      </a:r>
+                    </a:p>
+                  </a:txBody>
+                  <a:tcPr/>
+                </a:tc>
+                <a:tc>
+                  <a:txBody>
+                    <a:bodyPr/>
+                    <a:lstStyle/>
+                    <a:p>
+                      <a:r>
+                        <a:rPr lang="en-IN" dirty="0"/>
+                        <a:t>73.58%</a:t>
+                      </a:r>
+                    </a:p>
+                  </a:txBody>
+                  <a:tcPr/>
+                </a:tc>
+                <a:tc>
+                  <a:txBody>
+                    <a:bodyPr/>
+                    <a:lstStyle/>
+                    <a:p>
+                      <a:r>
+                        <a:rPr lang="en-IN" dirty="0"/>
+                        <a:t>0.4897</a:t>
+                      </a:r>
+                    </a:p>
+                  </a:txBody>
+                  <a:tcPr/>
+                </a:tc>
+                <a:tc>
+                  <a:txBody>
+                    <a:bodyPr/>
+                    <a:lstStyle/>
+                    <a:p>
+                      <a:r>
+                        <a:rPr lang="en-IN" dirty="0"/>
+                        <a:t>0.5212</a:t>
+                      </a:r>
+                    </a:p>
+                  </a:txBody>
+                  <a:tcPr/>
+                </a:tc>
+                <a:extLst>
+                  <a:ext uri="{0D108BD9-81ED-4DB2-BD59-A6C34878D82A}">
+                    <a16:rowId xmlns:a16="http://schemas.microsoft.com/office/drawing/2014/main" val="765008775"/>
+                  </a:ext>
+                </a:extLst>
+              </a:tr>
+              <a:tr h="414726">
+                <a:tc>
+                  <a:txBody>
+                    <a:bodyPr/>
+                    <a:lstStyle/>
+                    <a:p>
+                      <a:r>
+                        <a:rPr lang="en-IN" dirty="0"/>
+                        <a:t>Ridge Regression</a:t>
+                      </a:r>
+                    </a:p>
+                  </a:txBody>
+                  <a:tcPr/>
+                </a:tc>
+                <a:tc>
+                  <a:txBody>
+                    <a:bodyPr/>
+                    <a:lstStyle/>
+                    <a:p>
+                      <a:r>
+                        <a:rPr lang="en-IN" dirty="0"/>
+                        <a:t>75.64%</a:t>
+                      </a:r>
+                    </a:p>
+                  </a:txBody>
+                  <a:tcPr/>
+                </a:tc>
+                <a:tc>
+                  <a:txBody>
+                    <a:bodyPr/>
+                    <a:lstStyle/>
+                    <a:p>
+                      <a:r>
+                        <a:rPr lang="en-IN" dirty="0"/>
+                        <a:t>73.51%</a:t>
+                      </a:r>
+                    </a:p>
+                  </a:txBody>
+                  <a:tcPr/>
+                </a:tc>
+                <a:tc>
+                  <a:txBody>
+                    <a:bodyPr/>
+                    <a:lstStyle/>
+                    <a:p>
+                      <a:r>
+                        <a:rPr lang="en-IN" dirty="0"/>
+                        <a:t>0.4924</a:t>
+                      </a:r>
+                    </a:p>
+                  </a:txBody>
+                  <a:tcPr/>
+                </a:tc>
+                <a:tc>
+                  <a:txBody>
+                    <a:bodyPr/>
+                    <a:lstStyle/>
+                    <a:p>
+                      <a:r>
+                        <a:rPr lang="en-IN" dirty="0"/>
+                        <a:t>0.5226</a:t>
+                      </a:r>
+                    </a:p>
+                  </a:txBody>
+                  <a:tcPr/>
+                </a:tc>
+                <a:extLst>
+                  <a:ext uri="{0D108BD9-81ED-4DB2-BD59-A6C34878D82A}">
+                    <a16:rowId xmlns:a16="http://schemas.microsoft.com/office/drawing/2014/main" val="615029044"/>
+                  </a:ext>
+                </a:extLst>
+              </a:tr>
+              <a:tr h="414726">
+                <a:tc>
+                  <a:txBody>
+                    <a:bodyPr/>
+                    <a:lstStyle/>
+                    <a:p>
+                      <a:r>
+                        <a:rPr lang="en-IN" dirty="0"/>
+                        <a:t>SVM Regressor</a:t>
+                      </a:r>
+                    </a:p>
+                  </a:txBody>
+                  <a:tcPr/>
+                </a:tc>
+                <a:tc>
+                  <a:txBody>
+                    <a:bodyPr/>
+                    <a:lstStyle/>
+                    <a:p>
+                      <a:r>
+                        <a:rPr lang="en-IN" dirty="0"/>
+                        <a:t>88.04%</a:t>
+                      </a:r>
+                    </a:p>
+                  </a:txBody>
+                  <a:tcPr/>
+                </a:tc>
+                <a:tc>
+                  <a:txBody>
+                    <a:bodyPr/>
+                    <a:lstStyle/>
+                    <a:p>
+                      <a:r>
+                        <a:rPr lang="en-IN" dirty="0"/>
+                        <a:t>88.92%</a:t>
+                      </a:r>
+                    </a:p>
+                  </a:txBody>
+                  <a:tcPr/>
+                </a:tc>
+                <a:tc>
+                  <a:txBody>
+                    <a:bodyPr/>
+                    <a:lstStyle/>
+                    <a:p>
+                      <a:r>
+                        <a:rPr lang="en-IN" dirty="0"/>
+                        <a:t>0.3615</a:t>
+                      </a:r>
+                    </a:p>
+                  </a:txBody>
+                  <a:tcPr/>
+                </a:tc>
+                <a:tc>
+                  <a:txBody>
+                    <a:bodyPr/>
+                    <a:lstStyle/>
+                    <a:p>
+                      <a:r>
+                        <a:rPr lang="en-IN" dirty="0"/>
+                        <a:t>0.3415</a:t>
+                      </a:r>
+                    </a:p>
+                  </a:txBody>
+                  <a:tcPr/>
+                </a:tc>
+                <a:extLst>
+                  <a:ext uri="{0D108BD9-81ED-4DB2-BD59-A6C34878D82A}">
+                    <a16:rowId xmlns:a16="http://schemas.microsoft.com/office/drawing/2014/main" val="2951312833"/>
+                  </a:ext>
+                </a:extLst>
+              </a:tr>
+              <a:tr h="715829">
+                <a:tc>
+                  <a:txBody>
+                    <a:bodyPr/>
+                    <a:lstStyle/>
+                    <a:p>
+                      <a:r>
+                        <a:rPr lang="en-IN" dirty="0"/>
+                        <a:t>Random Forest Regressor</a:t>
+                      </a:r>
+                    </a:p>
+                  </a:txBody>
+                  <a:tcPr/>
+                </a:tc>
+                <a:tc>
+                  <a:txBody>
+                    <a:bodyPr/>
+                    <a:lstStyle/>
+                    <a:p>
+                      <a:r>
+                        <a:rPr lang="en-IN" dirty="0"/>
+                        <a:t>97.87%</a:t>
+                      </a:r>
+                    </a:p>
+                  </a:txBody>
+                  <a:tcPr/>
+                </a:tc>
+                <a:tc>
+                  <a:txBody>
+                    <a:bodyPr/>
+                    <a:lstStyle/>
+                    <a:p>
+                      <a:r>
+                        <a:rPr lang="en-IN" dirty="0"/>
+                        <a:t>90.64%</a:t>
+                      </a:r>
+                    </a:p>
+                  </a:txBody>
+                  <a:tcPr/>
+                </a:tc>
+                <a:tc>
+                  <a:txBody>
+                    <a:bodyPr/>
+                    <a:lstStyle/>
+                    <a:p>
+                      <a:r>
+                        <a:rPr lang="en-IN" dirty="0"/>
+                        <a:t>0.1511</a:t>
+                      </a:r>
+                    </a:p>
+                  </a:txBody>
+                  <a:tcPr/>
+                </a:tc>
+                <a:tc>
+                  <a:txBody>
+                    <a:bodyPr/>
+                    <a:lstStyle/>
+                    <a:p>
+                      <a:r>
+                        <a:rPr lang="en-IN" dirty="0"/>
+                        <a:t>0.3116</a:t>
+                      </a:r>
+                    </a:p>
+                  </a:txBody>
+                  <a:tcPr/>
+                </a:tc>
+                <a:extLst>
+                  <a:ext uri="{0D108BD9-81ED-4DB2-BD59-A6C34878D82A}">
+                    <a16:rowId xmlns:a16="http://schemas.microsoft.com/office/drawing/2014/main" val="3250272351"/>
+                  </a:ext>
+                </a:extLst>
+              </a:tr>
+              <a:tr h="414726">
+                <a:tc>
+                  <a:txBody>
+                    <a:bodyPr/>
+                    <a:lstStyle/>
+                    <a:p>
+                      <a:r>
+                        <a:rPr lang="en-IN" dirty="0" err="1"/>
+                        <a:t>XGBoost</a:t>
+                      </a:r>
+                      <a:r>
+                        <a:rPr lang="en-IN" dirty="0"/>
+                        <a:t> Regressor</a:t>
+                      </a:r>
+                    </a:p>
+                  </a:txBody>
+                  <a:tcPr/>
+                </a:tc>
+                <a:tc>
+                  <a:txBody>
+                    <a:bodyPr/>
+                    <a:lstStyle/>
+                    <a:p>
+                      <a:r>
+                        <a:rPr lang="en-IN" dirty="0"/>
+                        <a:t>96.56%</a:t>
+                      </a:r>
+                    </a:p>
+                  </a:txBody>
+                  <a:tcPr/>
+                </a:tc>
+                <a:tc>
+                  <a:txBody>
+                    <a:bodyPr/>
+                    <a:lstStyle/>
+                    <a:p>
+                      <a:r>
+                        <a:rPr lang="en-IN" dirty="0"/>
+                        <a:t>92.73%</a:t>
+                      </a:r>
+                    </a:p>
+                  </a:txBody>
+                  <a:tcPr/>
+                </a:tc>
+                <a:tc>
+                  <a:txBody>
+                    <a:bodyPr/>
+                    <a:lstStyle/>
+                    <a:p>
+                      <a:r>
+                        <a:rPr lang="en-IN" dirty="0"/>
+                        <a:t>0.1859</a:t>
+                      </a:r>
+                    </a:p>
+                  </a:txBody>
+                  <a:tcPr/>
+                </a:tc>
+                <a:tc>
+                  <a:txBody>
+                    <a:bodyPr/>
+                    <a:lstStyle/>
+                    <a:p>
+                      <a:r>
+                        <a:rPr lang="en-IN" dirty="0"/>
+                        <a:t>0.2688</a:t>
+                      </a:r>
+                    </a:p>
+                  </a:txBody>
+                  <a:tcPr/>
+                </a:tc>
+                <a:extLst>
+                  <a:ext uri="{0D108BD9-81ED-4DB2-BD59-A6C34878D82A}">
+                    <a16:rowId xmlns:a16="http://schemas.microsoft.com/office/drawing/2014/main" val="2285796489"/>
+                  </a:ext>
+                </a:extLst>
+              </a:tr>
+            </a:tbl>
+          </a:graphicData>
+        </a:graphic>
+      </p:graphicFrame>
+      <p:sp>
+        <p:nvSpPr>
+          <p:cNvPr id="5" name="TextBox 4">
+            <a:extLst>
+              <a:ext uri="{FF2B5EF4-FFF2-40B4-BE49-F238E27FC236}">
+                <a16:creationId xmlns:a16="http://schemas.microsoft.com/office/drawing/2014/main" id="{FF234027-3B78-D44E-0FBC-A7940AD3BCE6}"/>
+              </a:ext>
+            </a:extLst>
+          </p:cNvPr>
+          <p:cNvSpPr txBox="1"/>
+          <p:nvPr/>
+        </p:nvSpPr>
+        <p:spPr>
+          <a:xfrm>
+            <a:off x="838200" y="5422229"/>
+            <a:ext cx="9787636" cy="1323439"/>
+          </a:xfrm>
+          <a:prstGeom prst="rect">
+            <a:avLst/>
+          </a:prstGeom>
+          <a:noFill/>
+        </p:spPr>
+        <p:txBody>
+          <a:bodyPr wrap="square" rtlCol="0">
+            <a:spAutoFit/>
+          </a:bodyPr>
+          <a:lstStyle/>
+          <a:p>
+            <a:r>
+              <a:rPr lang="en-IN" sz="2000" dirty="0"/>
+              <a:t>The linear regression model performed significantly well and there is not much difference observed in the case of lasso and Ridge.</a:t>
+            </a:r>
+          </a:p>
+          <a:p>
+            <a:r>
+              <a:rPr lang="en-IN" sz="2000" dirty="0"/>
+              <a:t>Bagging and boosting regressors did very well and we got test R-squared above 90% with minimum RMSE compared to other models.</a:t>
+            </a:r>
+          </a:p>
+        </p:txBody>
+      </p:sp>
+    </p:spTree>
+    <p:extLst>
+      <p:ext uri="{BB962C8B-B14F-4D97-AF65-F5344CB8AC3E}">
+        <p14:creationId xmlns:p14="http://schemas.microsoft.com/office/powerpoint/2010/main" val="4090539189"/>
+      </p:ext>
+    </p:extLst>
+  </p:cSld>
+  <p:clrMapOvr>
+    <a:masterClrMapping/>
+  </p:clrMapOvr>
+</p:sld>
+</file>
+
+<file path=ppt/slides/slide23.xml><?xml version="1.0" encoding="utf-8"?>
+<p:sld xmlns:a="http://schemas.openxmlformats.org/drawingml/2006/main" xmlns:r="http://schemas.openxmlformats.org/officeDocument/2006/relationships" xmlns:p="http://schemas.openxmlformats.org/presentationml/2006/main">
+  <p:cSld>
+    <p:spTree>
+      <p:nvGrpSpPr>
+        <p:cNvPr id="1" name=""/>
+        <p:cNvGrpSpPr/>
+        <p:nvPr/>
+      </p:nvGrpSpPr>
+      <p:grpSpPr>
+        <a:xfrm>
+          <a:off x="0" y="0"/>
+          <a:ext cx="0" cy="0"/>
+          <a:chOff x="0" y="0"/>
+          <a:chExt cx="0" cy="0"/>
+        </a:xfrm>
+      </p:grpSpPr>
+      <p:sp>
+        <p:nvSpPr>
+          <p:cNvPr id="2" name="Title 1">
+            <a:extLst>
+              <a:ext uri="{FF2B5EF4-FFF2-40B4-BE49-F238E27FC236}">
+                <a16:creationId xmlns:a16="http://schemas.microsoft.com/office/drawing/2014/main" id="{2E474F94-4E61-17E6-1DC9-6753BCDB87E6}"/>
+              </a:ext>
+            </a:extLst>
+          </p:cNvPr>
+          <p:cNvSpPr>
+            <a:spLocks noGrp="1"/>
+          </p:cNvSpPr>
+          <p:nvPr>
+            <p:ph type="ctrTitle"/>
+          </p:nvPr>
+        </p:nvSpPr>
+        <p:spPr>
+          <a:xfrm>
+            <a:off x="3204642" y="2353641"/>
+            <a:ext cx="5782716" cy="2150719"/>
+          </a:xfrm>
+          <a:noFill/>
+        </p:spPr>
+        <p:txBody>
+          <a:bodyPr anchor="ctr">
+            <a:normAutofit/>
+          </a:bodyPr>
+          <a:lstStyle/>
+          <a:p>
+            <a:r>
+              <a:rPr lang="en-US" sz="5400" b="1" dirty="0">
+                <a:solidFill>
+                  <a:srgbClr val="080808"/>
+                </a:solidFill>
+                <a:latin typeface="Calibri" panose="020F0502020204030204" pitchFamily="34" charset="0"/>
+                <a:cs typeface="Calibri" panose="020F0502020204030204" pitchFamily="34" charset="0"/>
+              </a:rPr>
+              <a:t>THANK YOU</a:t>
+            </a:r>
+            <a:endParaRPr lang="hi-IN" sz="5400" b="1" dirty="0">
+              <a:solidFill>
+                <a:srgbClr val="080808"/>
+              </a:solidFill>
+              <a:latin typeface="Calibri" panose="020F0502020204030204" pitchFamily="34" charset="0"/>
+            </a:endParaRPr>
+          </a:p>
+        </p:txBody>
+      </p:sp>
+    </p:spTree>
+    <p:extLst>
+      <p:ext uri="{BB962C8B-B14F-4D97-AF65-F5344CB8AC3E}">
+        <p14:creationId xmlns:p14="http://schemas.microsoft.com/office/powerpoint/2010/main" val="730172255"/>
+      </p:ext>
+    </p:extLst>
+  </p:cSld>
+  <p:clrMapOvr>
+    <a:masterClrMapping/>
+  </p:clrMapOvr>
+</p:sld>
+</file>
+
 <file path=ppt/slides/slide3.xml><?xml version="1.0" encoding="utf-8"?>
 <p:sld xmlns:a="http://schemas.openxmlformats.org/drawingml/2006/main" xmlns:r="http://schemas.openxmlformats.org/officeDocument/2006/relationships" xmlns:p="http://schemas.openxmlformats.org/presentationml/2006/main">
   <p:cSld>

</xml_diff>